<commit_message>
sunum hazir konusma da hazir ALLAH YARDIMCINIZ OLSUN
</commit_message>
<xml_diff>
--- a/sunum18Jan.pptx
+++ b/sunum18Jan.pptx
@@ -5,44 +5,45 @@
     <p:sldMasterId id="2147483648" r:id="rId1"/>
   </p:sldMasterIdLst>
   <p:notesMasterIdLst>
-    <p:notesMasterId r:id="rId37"/>
+    <p:notesMasterId r:id="rId38"/>
   </p:notesMasterIdLst>
   <p:sldIdLst>
     <p:sldId id="335" r:id="rId2"/>
     <p:sldId id="296" r:id="rId3"/>
     <p:sldId id="259" r:id="rId4"/>
     <p:sldId id="260" r:id="rId5"/>
-    <p:sldId id="262" r:id="rId6"/>
-    <p:sldId id="263" r:id="rId7"/>
-    <p:sldId id="268" r:id="rId8"/>
-    <p:sldId id="272" r:id="rId9"/>
-    <p:sldId id="274" r:id="rId10"/>
-    <p:sldId id="276" r:id="rId11"/>
-    <p:sldId id="280" r:id="rId12"/>
-    <p:sldId id="285" r:id="rId13"/>
-    <p:sldId id="283" r:id="rId14"/>
-    <p:sldId id="303" r:id="rId15"/>
-    <p:sldId id="304" r:id="rId16"/>
-    <p:sldId id="307" r:id="rId17"/>
-    <p:sldId id="308" r:id="rId18"/>
-    <p:sldId id="309" r:id="rId19"/>
-    <p:sldId id="310" r:id="rId20"/>
-    <p:sldId id="311" r:id="rId21"/>
-    <p:sldId id="313" r:id="rId22"/>
-    <p:sldId id="314" r:id="rId23"/>
-    <p:sldId id="316" r:id="rId24"/>
-    <p:sldId id="334" r:id="rId25"/>
-    <p:sldId id="318" r:id="rId26"/>
-    <p:sldId id="319" r:id="rId27"/>
-    <p:sldId id="320" r:id="rId28"/>
-    <p:sldId id="321" r:id="rId29"/>
-    <p:sldId id="323" r:id="rId30"/>
-    <p:sldId id="324" r:id="rId31"/>
-    <p:sldId id="325" r:id="rId32"/>
-    <p:sldId id="328" r:id="rId33"/>
-    <p:sldId id="330" r:id="rId34"/>
-    <p:sldId id="332" r:id="rId35"/>
-    <p:sldId id="336" r:id="rId36"/>
+    <p:sldId id="337" r:id="rId6"/>
+    <p:sldId id="262" r:id="rId7"/>
+    <p:sldId id="263" r:id="rId8"/>
+    <p:sldId id="268" r:id="rId9"/>
+    <p:sldId id="272" r:id="rId10"/>
+    <p:sldId id="274" r:id="rId11"/>
+    <p:sldId id="276" r:id="rId12"/>
+    <p:sldId id="280" r:id="rId13"/>
+    <p:sldId id="285" r:id="rId14"/>
+    <p:sldId id="283" r:id="rId15"/>
+    <p:sldId id="303" r:id="rId16"/>
+    <p:sldId id="304" r:id="rId17"/>
+    <p:sldId id="307" r:id="rId18"/>
+    <p:sldId id="308" r:id="rId19"/>
+    <p:sldId id="309" r:id="rId20"/>
+    <p:sldId id="310" r:id="rId21"/>
+    <p:sldId id="311" r:id="rId22"/>
+    <p:sldId id="316" r:id="rId23"/>
+    <p:sldId id="313" r:id="rId24"/>
+    <p:sldId id="314" r:id="rId25"/>
+    <p:sldId id="334" r:id="rId26"/>
+    <p:sldId id="318" r:id="rId27"/>
+    <p:sldId id="319" r:id="rId28"/>
+    <p:sldId id="320" r:id="rId29"/>
+    <p:sldId id="321" r:id="rId30"/>
+    <p:sldId id="323" r:id="rId31"/>
+    <p:sldId id="324" r:id="rId32"/>
+    <p:sldId id="325" r:id="rId33"/>
+    <p:sldId id="328" r:id="rId34"/>
+    <p:sldId id="330" r:id="rId35"/>
+    <p:sldId id="332" r:id="rId36"/>
+    <p:sldId id="336" r:id="rId37"/>
   </p:sldIdLst>
   <p:sldSz cx="9144000" cy="6858000" type="screen4x3"/>
   <p:notesSz cx="6858000" cy="9144000"/>
@@ -227,7 +228,7 @@
             <a:fld id="{412B4FB5-DB9C-408E-9DB4-4509C0792843}" type="datetimeFigureOut">
               <a:rPr lang="tr-TR" smtClean="0"/>
               <a:pPr/>
-              <a:t>1/17/13</a:t>
+              <a:t>17.01.2013</a:t>
             </a:fld>
             <a:endParaRPr lang="en-US" dirty="0"/>
           </a:p>
@@ -398,7 +399,7 @@
     </p:spTree>
     <p:extLst>
       <p:ext uri="{BB962C8B-B14F-4D97-AF65-F5344CB8AC3E}">
-        <p14:creationId xmlns:p14="http://schemas.microsoft.com/office/powerpoint/2010/main" val="1728728690"/>
+        <p14:creationId xmlns:p14="http://schemas.microsoft.com/office/powerpoint/2010/main" xmlns="" val="1728728690"/>
       </p:ext>
     </p:extLst>
   </p:cSld>
@@ -566,7 +567,7 @@
             <a:fld id="{A1EAFB59-DC4D-4EED-85F4-1C64D3038115}" type="slidenum">
               <a:rPr lang="en-US" smtClean="0"/>
               <a:pPr/>
-              <a:t>5</a:t>
+              <a:t>6</a:t>
             </a:fld>
             <a:endParaRPr lang="en-US" dirty="0"/>
           </a:p>
@@ -762,7 +763,7 @@
             <a:fld id="{34990BF1-3FBF-4FBC-A078-BCBD6928206A}" type="datetimeFigureOut">
               <a:rPr lang="tr-TR" smtClean="0"/>
               <a:pPr/>
-              <a:t>1/17/13</a:t>
+              <a:t>17.01.2013</a:t>
             </a:fld>
             <a:endParaRPr lang="en-US" dirty="0"/>
           </a:p>
@@ -929,7 +930,7 @@
             <a:fld id="{34990BF1-3FBF-4FBC-A078-BCBD6928206A}" type="datetimeFigureOut">
               <a:rPr lang="tr-TR" smtClean="0"/>
               <a:pPr/>
-              <a:t>1/17/13</a:t>
+              <a:t>17.01.2013</a:t>
             </a:fld>
             <a:endParaRPr lang="en-US" dirty="0"/>
           </a:p>
@@ -1106,7 +1107,7 @@
             <a:fld id="{34990BF1-3FBF-4FBC-A078-BCBD6928206A}" type="datetimeFigureOut">
               <a:rPr lang="tr-TR" smtClean="0"/>
               <a:pPr/>
-              <a:t>1/17/13</a:t>
+              <a:t>17.01.2013</a:t>
             </a:fld>
             <a:endParaRPr lang="en-US" dirty="0"/>
           </a:p>
@@ -1273,7 +1274,7 @@
             <a:fld id="{34990BF1-3FBF-4FBC-A078-BCBD6928206A}" type="datetimeFigureOut">
               <a:rPr lang="tr-TR" smtClean="0"/>
               <a:pPr/>
-              <a:t>1/17/13</a:t>
+              <a:t>17.01.2013</a:t>
             </a:fld>
             <a:endParaRPr lang="en-US" dirty="0"/>
           </a:p>
@@ -1516,7 +1517,7 @@
             <a:fld id="{34990BF1-3FBF-4FBC-A078-BCBD6928206A}" type="datetimeFigureOut">
               <a:rPr lang="tr-TR" smtClean="0"/>
               <a:pPr/>
-              <a:t>1/17/13</a:t>
+              <a:t>17.01.2013</a:t>
             </a:fld>
             <a:endParaRPr lang="en-US" dirty="0"/>
           </a:p>
@@ -1801,7 +1802,7 @@
             <a:fld id="{34990BF1-3FBF-4FBC-A078-BCBD6928206A}" type="datetimeFigureOut">
               <a:rPr lang="tr-TR" smtClean="0"/>
               <a:pPr/>
-              <a:t>1/17/13</a:t>
+              <a:t>17.01.2013</a:t>
             </a:fld>
             <a:endParaRPr lang="en-US" dirty="0"/>
           </a:p>
@@ -2220,7 +2221,7 @@
             <a:fld id="{34990BF1-3FBF-4FBC-A078-BCBD6928206A}" type="datetimeFigureOut">
               <a:rPr lang="tr-TR" smtClean="0"/>
               <a:pPr/>
-              <a:t>1/17/13</a:t>
+              <a:t>17.01.2013</a:t>
             </a:fld>
             <a:endParaRPr lang="en-US" dirty="0"/>
           </a:p>
@@ -2335,7 +2336,7 @@
             <a:fld id="{34990BF1-3FBF-4FBC-A078-BCBD6928206A}" type="datetimeFigureOut">
               <a:rPr lang="tr-TR" smtClean="0"/>
               <a:pPr/>
-              <a:t>1/17/13</a:t>
+              <a:t>17.01.2013</a:t>
             </a:fld>
             <a:endParaRPr lang="en-US" dirty="0"/>
           </a:p>
@@ -2427,7 +2428,7 @@
             <a:fld id="{34990BF1-3FBF-4FBC-A078-BCBD6928206A}" type="datetimeFigureOut">
               <a:rPr lang="tr-TR" smtClean="0"/>
               <a:pPr/>
-              <a:t>1/17/13</a:t>
+              <a:t>17.01.2013</a:t>
             </a:fld>
             <a:endParaRPr lang="en-US" dirty="0"/>
           </a:p>
@@ -2701,7 +2702,7 @@
             <a:fld id="{34990BF1-3FBF-4FBC-A078-BCBD6928206A}" type="datetimeFigureOut">
               <a:rPr lang="tr-TR" smtClean="0"/>
               <a:pPr/>
-              <a:t>1/17/13</a:t>
+              <a:t>17.01.2013</a:t>
             </a:fld>
             <a:endParaRPr lang="en-US" dirty="0"/>
           </a:p>
@@ -2951,7 +2952,7 @@
             <a:fld id="{34990BF1-3FBF-4FBC-A078-BCBD6928206A}" type="datetimeFigureOut">
               <a:rPr lang="tr-TR" smtClean="0"/>
               <a:pPr/>
-              <a:t>1/17/13</a:t>
+              <a:t>17.01.2013</a:t>
             </a:fld>
             <a:endParaRPr lang="en-US" dirty="0"/>
           </a:p>
@@ -3161,7 +3162,7 @@
             <a:fld id="{34990BF1-3FBF-4FBC-A078-BCBD6928206A}" type="datetimeFigureOut">
               <a:rPr lang="tr-TR" smtClean="0"/>
               <a:pPr/>
-              <a:t>1/17/13</a:t>
+              <a:t>17.01.2013</a:t>
             </a:fld>
             <a:endParaRPr lang="en-US" dirty="0"/>
           </a:p>
@@ -3577,33 +3578,7 @@
                 <a:effectLst/>
                 <a:cs typeface="Arial"/>
               </a:rPr>
-              <a:t>and Seamless </a:t>
-            </a:r>
-            <a:r>
-              <a:rPr lang="en-US" sz="3200" b="1" kern="0" noProof="0" dirty="0" smtClean="0">
-                <a:ln w="9000" cmpd="sng">
-                  <a:solidFill>
-                    <a:schemeClr val="bg1"/>
-                  </a:solidFill>
-                  <a:prstDash val="solid"/>
-                </a:ln>
-                <a:effectLst/>
-                <a:cs typeface="Arial"/>
-              </a:rPr>
-              <a:t>Prepayment </a:t>
-            </a:r>
-            <a:r>
-              <a:rPr lang="en-US" sz="3200" b="1" kern="0" noProof="0" dirty="0" smtClean="0">
-                <a:ln w="9000" cmpd="sng">
-                  <a:solidFill>
-                    <a:schemeClr val="bg1"/>
-                  </a:solidFill>
-                  <a:prstDash val="solid"/>
-                </a:ln>
-                <a:effectLst/>
-                <a:cs typeface="Arial"/>
-              </a:rPr>
-              <a:t>for Wireless Mesh Networks</a:t>
+              <a:t>and Seamless Prepayment for Wireless Mesh Networks</a:t>
             </a:r>
             <a:r>
               <a:rPr lang="en-US" sz="3200" b="1" kern="0" noProof="0" dirty="0" smtClean="0">
@@ -3700,17 +3675,7 @@
                 <a:latin typeface="+mj-lt"/>
                 <a:cs typeface="Times New Roman" pitchFamily="18" charset="0"/>
               </a:rPr>
-              <a:t>Can </a:t>
-            </a:r>
-            <a:r>
-              <a:rPr lang="en-US" noProof="0" dirty="0" smtClean="0">
-                <a:solidFill>
-                  <a:srgbClr val="515151"/>
-                </a:solidFill>
-                <a:latin typeface="+mj-lt"/>
-                <a:cs typeface="Times New Roman" pitchFamily="18" charset="0"/>
-              </a:rPr>
-              <a:t>Serhat Leloğlu</a:t>
+              <a:t>Can Serhat Leloğlu</a:t>
             </a:r>
           </a:p>
           <a:p>
@@ -3722,17 +3687,7 @@
                 <a:latin typeface="+mj-lt"/>
                 <a:cs typeface="Times New Roman" pitchFamily="18" charset="0"/>
               </a:rPr>
-              <a:t>canleloglu</a:t>
-            </a:r>
-            <a:r>
-              <a:rPr lang="en-US" sz="1800" noProof="0" dirty="0" err="1" smtClean="0">
-                <a:solidFill>
-                  <a:srgbClr val="515151"/>
-                </a:solidFill>
-                <a:latin typeface="+mj-lt"/>
-                <a:cs typeface="Times New Roman" pitchFamily="18" charset="0"/>
-              </a:rPr>
-              <a:t>@sabanciuniv.edu</a:t>
+              <a:t>canleloglu@sabanciuniv.edu</a:t>
             </a:r>
             <a:r>
               <a:rPr lang="en-US" sz="1800" noProof="0" dirty="0" smtClean="0">
@@ -3790,7 +3745,7 @@
           <a:blip r:embed="rId2" cstate="print">
             <a:extLst>
               <a:ext uri="{28A0092B-C50C-407E-A947-70E740481C1C}">
-                <a14:useLocalDpi xmlns:a14="http://schemas.microsoft.com/office/drawing/2010/main" val="0"/>
+                <a14:useLocalDpi xmlns:a14="http://schemas.microsoft.com/office/drawing/2010/main" xmlns="" val="0"/>
               </a:ext>
             </a:extLst>
           </a:blip>
@@ -3835,7 +3790,7 @@
     </p:spTree>
     <p:extLst>
       <p:ext uri="{BB962C8B-B14F-4D97-AF65-F5344CB8AC3E}">
-        <p14:creationId xmlns:p14="http://schemas.microsoft.com/office/powerpoint/2010/main" val="3462100809"/>
+        <p14:creationId xmlns:p14="http://schemas.microsoft.com/office/powerpoint/2010/main" xmlns="" val="3462100809"/>
       </p:ext>
     </p:extLst>
   </p:cSld>
@@ -3845,7 +3800,7 @@
   <p:timing>
     <p:tnLst>
       <p:par>
-        <p:cTn xmlns:p14="http://schemas.microsoft.com/office/powerpoint/2010/main" id="1" dur="indefinite" restart="never" nodeType="tmRoot"/>
+        <p:cTn id="1" dur="indefinite" restart="never" nodeType="tmRoot"/>
       </p:par>
     </p:tnLst>
   </p:timing>
@@ -3879,6 +3834,129 @@
             <p:ph type="title"/>
           </p:nvPr>
         </p:nvSpPr>
+        <p:spPr>
+          <a:xfrm>
+            <a:off x="457200" y="274638"/>
+            <a:ext cx="8229600" cy="850106"/>
+          </a:xfrm>
+        </p:spPr>
+        <p:txBody>
+          <a:bodyPr/>
+          <a:lstStyle/>
+          <a:p>
+            <a:r>
+              <a:rPr lang="en-US" noProof="0" smtClean="0"/>
+              <a:t>Packet Transfer</a:t>
+            </a:r>
+            <a:endParaRPr lang="en-US" noProof="0"/>
+          </a:p>
+        </p:txBody>
+      </p:sp>
+      <p:sp>
+        <p:nvSpPr>
+          <p:cNvPr id="5" name="Content Placeholder 2"/>
+          <p:cNvSpPr>
+            <a:spLocks noGrp="1"/>
+          </p:cNvSpPr>
+          <p:nvPr>
+            <p:ph idx="1"/>
+          </p:nvPr>
+        </p:nvSpPr>
+        <p:spPr>
+          <a:xfrm>
+            <a:off x="467544" y="1124744"/>
+            <a:ext cx="8229600" cy="748680"/>
+          </a:xfrm>
+        </p:spPr>
+        <p:txBody>
+          <a:bodyPr>
+            <a:normAutofit fontScale="77500" lnSpcReduction="20000"/>
+          </a:bodyPr>
+          <a:lstStyle/>
+          <a:p>
+            <a:r>
+              <a:rPr lang="en-US" noProof="0" smtClean="0"/>
+              <a:t>After mutual authentication of client and  access point, client starts to send data packets to access point.</a:t>
+            </a:r>
+            <a:endParaRPr lang="en-US" noProof="0"/>
+          </a:p>
+        </p:txBody>
+      </p:sp>
+      <p:pic>
+        <p:nvPicPr>
+          <p:cNvPr id="6" name="Picture 5" descr="Macintosh HD:Users:canleloglu:Desktop:worddoc:thesisImages:protocolsInDetail:seqDiagram:pdf:packetTransfer.pdf"/>
+          <p:cNvPicPr/>
+          <p:nvPr/>
+        </p:nvPicPr>
+        <p:blipFill>
+          <a:blip r:embed="rId2" cstate="print">
+            <a:extLst>
+              <a:ext uri="{28A0092B-C50C-407E-A947-70E740481C1C}">
+                <a14:useLocalDpi xmlns:a14="http://schemas.microsoft.com/office/drawing/2010/main" xmlns="" val="0"/>
+              </a:ext>
+            </a:extLst>
+          </a:blip>
+          <a:srcRect/>
+          <a:stretch>
+            <a:fillRect/>
+          </a:stretch>
+        </p:blipFill>
+        <p:spPr bwMode="auto">
+          <a:xfrm>
+            <a:off x="2214546" y="1785922"/>
+            <a:ext cx="4481401" cy="5072078"/>
+          </a:xfrm>
+          <a:prstGeom prst="rect">
+            <a:avLst/>
+          </a:prstGeom>
+          <a:noFill/>
+          <a:ln>
+            <a:noFill/>
+          </a:ln>
+        </p:spPr>
+      </p:pic>
+    </p:spTree>
+  </p:cSld>
+  <p:clrMapOvr>
+    <a:masterClrMapping/>
+  </p:clrMapOvr>
+  <p:timing>
+    <p:tnLst>
+      <p:par>
+        <p:cTn id="1" dur="indefinite" restart="never" nodeType="tmRoot"/>
+      </p:par>
+    </p:tnLst>
+  </p:timing>
+</p:sld>
+</file>
+
+<file path=ppt/slides/slide11.xml><?xml version="1.0" encoding="utf-8"?>
+<p:sld xmlns:a="http://schemas.openxmlformats.org/drawingml/2006/main" xmlns:r="http://schemas.openxmlformats.org/officeDocument/2006/relationships" xmlns:p="http://schemas.openxmlformats.org/presentationml/2006/main">
+  <p:cSld>
+    <p:spTree>
+      <p:nvGrpSpPr>
+        <p:cNvPr id="1" name=""/>
+        <p:cNvGrpSpPr/>
+        <p:nvPr/>
+      </p:nvGrpSpPr>
+      <p:grpSpPr>
+        <a:xfrm>
+          <a:off x="0" y="0"/>
+          <a:ext cx="0" cy="0"/>
+          <a:chOff x="0" y="0"/>
+          <a:chExt cx="0" cy="0"/>
+        </a:xfrm>
+      </p:grpSpPr>
+      <p:sp>
+        <p:nvSpPr>
+          <p:cNvPr id="2" name="Title 1"/>
+          <p:cNvSpPr>
+            <a:spLocks noGrp="1"/>
+          </p:cNvSpPr>
+          <p:nvPr>
+            <p:ph type="title"/>
+          </p:nvPr>
+        </p:nvSpPr>
         <p:spPr/>
         <p:txBody>
           <a:bodyPr/>
@@ -3902,7 +3980,7 @@
           <a:blip r:embed="rId2" cstate="print">
             <a:extLst>
               <a:ext uri="{28A0092B-C50C-407E-A947-70E740481C1C}">
-                <a14:useLocalDpi xmlns:a14="http://schemas.microsoft.com/office/drawing/2010/main" val="0"/>
+                <a14:useLocalDpi xmlns:a14="http://schemas.microsoft.com/office/drawing/2010/main" xmlns="" val="0"/>
               </a:ext>
             </a:extLst>
           </a:blip>
@@ -3933,95 +4011,7 @@
   <p:timing>
     <p:tnLst>
       <p:par>
-        <p:cTn xmlns:p14="http://schemas.microsoft.com/office/powerpoint/2010/main" id="1" dur="indefinite" restart="never" nodeType="tmRoot"/>
-      </p:par>
-    </p:tnLst>
-  </p:timing>
-</p:sld>
-</file>
-
-<file path=ppt/slides/slide11.xml><?xml version="1.0" encoding="utf-8"?>
-<p:sld xmlns:a="http://schemas.openxmlformats.org/drawingml/2006/main" xmlns:r="http://schemas.openxmlformats.org/officeDocument/2006/relationships" xmlns:p="http://schemas.openxmlformats.org/presentationml/2006/main">
-  <p:cSld>
-    <p:spTree>
-      <p:nvGrpSpPr>
-        <p:cNvPr id="1" name=""/>
-        <p:cNvGrpSpPr/>
-        <p:nvPr/>
-      </p:nvGrpSpPr>
-      <p:grpSpPr>
-        <a:xfrm>
-          <a:off x="0" y="0"/>
-          <a:ext cx="0" cy="0"/>
-          <a:chOff x="0" y="0"/>
-          <a:chExt cx="0" cy="0"/>
-        </a:xfrm>
-      </p:grpSpPr>
-      <p:sp>
-        <p:nvSpPr>
-          <p:cNvPr id="2" name="Title 1"/>
-          <p:cNvSpPr>
-            <a:spLocks noGrp="1"/>
-          </p:cNvSpPr>
-          <p:nvPr>
-            <p:ph type="title"/>
-          </p:nvPr>
-        </p:nvSpPr>
-        <p:spPr/>
-        <p:txBody>
-          <a:bodyPr/>
-          <a:lstStyle/>
-          <a:p>
-            <a:r>
-              <a:rPr lang="en-US" noProof="0" smtClean="0"/>
-              <a:t>Disconnection</a:t>
-            </a:r>
-            <a:endParaRPr lang="en-US" noProof="0"/>
-          </a:p>
-        </p:txBody>
-      </p:sp>
-      <p:pic>
-        <p:nvPicPr>
-          <p:cNvPr id="5" name="Picture 4" descr="Macintosh HD:Users:canleloglu:Desktop:worddoc:thesisImages:protocolsInDetail:seqDiagram:pdf:updatePackets.pdf"/>
-          <p:cNvPicPr/>
-          <p:nvPr/>
-        </p:nvPicPr>
-        <p:blipFill>
-          <a:blip r:embed="rId2" cstate="print">
-            <a:extLst>
-              <a:ext uri="{28A0092B-C50C-407E-A947-70E740481C1C}">
-                <a14:useLocalDpi xmlns:a14="http://schemas.microsoft.com/office/drawing/2010/main" val="0"/>
-              </a:ext>
-            </a:extLst>
-          </a:blip>
-          <a:srcRect/>
-          <a:stretch>
-            <a:fillRect/>
-          </a:stretch>
-        </p:blipFill>
-        <p:spPr bwMode="auto">
-          <a:xfrm>
-            <a:off x="1643042" y="1285860"/>
-            <a:ext cx="5730875" cy="5359400"/>
-          </a:xfrm>
-          <a:prstGeom prst="rect">
-            <a:avLst/>
-          </a:prstGeom>
-          <a:noFill/>
-          <a:ln>
-            <a:noFill/>
-          </a:ln>
-        </p:spPr>
-      </p:pic>
-    </p:spTree>
-  </p:cSld>
-  <p:clrMapOvr>
-    <a:masterClrMapping/>
-  </p:clrMapOvr>
-  <p:timing>
-    <p:tnLst>
-      <p:par>
-        <p:cTn xmlns:p14="http://schemas.microsoft.com/office/powerpoint/2010/main" id="1" dur="indefinite" restart="never" nodeType="tmRoot"/>
+        <p:cTn id="1" dur="indefinite" restart="never" nodeType="tmRoot"/>
       </p:par>
     </p:tnLst>
   </p:timing>
@@ -4057,6 +4047,81 @@
         </p:nvSpPr>
         <p:spPr/>
         <p:txBody>
+          <a:bodyPr/>
+          <a:lstStyle/>
+          <a:p>
+            <a:r>
+              <a:rPr lang="en-US" noProof="0" smtClean="0"/>
+              <a:t>Disconnection</a:t>
+            </a:r>
+            <a:endParaRPr lang="en-US" noProof="0"/>
+          </a:p>
+        </p:txBody>
+      </p:sp>
+      <p:graphicFrame>
+        <p:nvGraphicFramePr>
+          <p:cNvPr id="2051" name="Object 3"/>
+          <p:cNvGraphicFramePr>
+            <a:graphicFrameLocks noChangeAspect="1"/>
+          </p:cNvGraphicFramePr>
+          <p:nvPr/>
+        </p:nvGraphicFramePr>
+        <p:xfrm>
+          <a:off x="1714480" y="1500174"/>
+          <a:ext cx="5572164" cy="4905375"/>
+        </p:xfrm>
+        <a:graphic>
+          <a:graphicData uri="http://schemas.openxmlformats.org/presentationml/2006/ole">
+            <p:oleObj spid="_x0000_s2051" name="Acrobat Document" r:id="rId3" imgW="4238506" imgH="4905208" progId="AcroExch.Document.11">
+              <p:embed/>
+            </p:oleObj>
+          </a:graphicData>
+        </a:graphic>
+      </p:graphicFrame>
+    </p:spTree>
+  </p:cSld>
+  <p:clrMapOvr>
+    <a:masterClrMapping/>
+  </p:clrMapOvr>
+  <p:timing>
+    <p:tnLst>
+      <p:par>
+        <p:cTn id="1" dur="indefinite" restart="never" nodeType="tmRoot"/>
+      </p:par>
+    </p:tnLst>
+  </p:timing>
+</p:sld>
+</file>
+
+<file path=ppt/slides/slide13.xml><?xml version="1.0" encoding="utf-8"?>
+<p:sld xmlns:a="http://schemas.openxmlformats.org/drawingml/2006/main" xmlns:r="http://schemas.openxmlformats.org/officeDocument/2006/relationships" xmlns:p="http://schemas.openxmlformats.org/presentationml/2006/main">
+  <p:cSld>
+    <p:spTree>
+      <p:nvGrpSpPr>
+        <p:cNvPr id="1" name=""/>
+        <p:cNvGrpSpPr/>
+        <p:nvPr/>
+      </p:nvGrpSpPr>
+      <p:grpSpPr>
+        <a:xfrm>
+          <a:off x="0" y="0"/>
+          <a:ext cx="0" cy="0"/>
+          <a:chOff x="0" y="0"/>
+          <a:chExt cx="0" cy="0"/>
+        </a:xfrm>
+      </p:grpSpPr>
+      <p:sp>
+        <p:nvSpPr>
+          <p:cNvPr id="2" name="Title 1"/>
+          <p:cNvSpPr>
+            <a:spLocks noGrp="1"/>
+          </p:cNvSpPr>
+          <p:nvPr>
+            <p:ph type="title"/>
+          </p:nvPr>
+        </p:nvSpPr>
+        <p:spPr/>
+        <p:txBody>
           <a:bodyPr>
             <a:normAutofit fontScale="90000"/>
           </a:bodyPr>
@@ -4108,10 +4173,10 @@
           <p:nvPr/>
         </p:nvPicPr>
         <p:blipFill>
-          <a:blip r:embed="rId2">
+          <a:blip r:embed="rId2" cstate="print">
             <a:extLst>
               <a:ext uri="{28A0092B-C50C-407E-A947-70E740481C1C}">
-                <a14:useLocalDpi xmlns:a14="http://schemas.microsoft.com/office/drawing/2010/main" val="0"/>
+                <a14:useLocalDpi xmlns:a14="http://schemas.microsoft.com/office/drawing/2010/main" xmlns="" val="0"/>
               </a:ext>
             </a:extLst>
           </a:blip>
@@ -4137,14 +4202,14 @@
   <p:timing>
     <p:tnLst>
       <p:par>
-        <p:cTn xmlns:p14="http://schemas.microsoft.com/office/powerpoint/2010/main" id="1" dur="indefinite" restart="never" nodeType="tmRoot"/>
+        <p:cTn id="1" dur="indefinite" restart="never" nodeType="tmRoot"/>
       </p:par>
     </p:tnLst>
   </p:timing>
 </p:sld>
 </file>
 
-<file path=ppt/slides/slide13.xml><?xml version="1.0" encoding="utf-8"?>
+<file path=ppt/slides/slide14.xml><?xml version="1.0" encoding="utf-8"?>
 <p:sld xmlns:a="http://schemas.openxmlformats.org/drawingml/2006/main" xmlns:r="http://schemas.openxmlformats.org/officeDocument/2006/relationships" xmlns:p="http://schemas.openxmlformats.org/presentationml/2006/main">
   <p:cSld>
     <p:spTree>
@@ -4222,10 +4287,10 @@
           <p:nvPr/>
         </p:nvPicPr>
         <p:blipFill>
-          <a:blip r:embed="rId2">
+          <a:blip r:embed="rId2" cstate="print">
             <a:extLst>
               <a:ext uri="{28A0092B-C50C-407E-A947-70E740481C1C}">
-                <a14:useLocalDpi xmlns:a14="http://schemas.microsoft.com/office/drawing/2010/main" val="0"/>
+                <a14:useLocalDpi xmlns:a14="http://schemas.microsoft.com/office/drawing/2010/main" xmlns="" val="0"/>
               </a:ext>
             </a:extLst>
           </a:blip>
@@ -4251,95 +4316,7 @@
   <p:timing>
     <p:tnLst>
       <p:par>
-        <p:cTn xmlns:p14="http://schemas.microsoft.com/office/powerpoint/2010/main" id="1" dur="indefinite" restart="never" nodeType="tmRoot"/>
-      </p:par>
-    </p:tnLst>
-  </p:timing>
-</p:sld>
-</file>
-
-<file path=ppt/slides/slide14.xml><?xml version="1.0" encoding="utf-8"?>
-<p:sld xmlns:a="http://schemas.openxmlformats.org/drawingml/2006/main" xmlns:r="http://schemas.openxmlformats.org/officeDocument/2006/relationships" xmlns:p="http://schemas.openxmlformats.org/presentationml/2006/main">
-  <p:cSld>
-    <p:spTree>
-      <p:nvGrpSpPr>
-        <p:cNvPr id="1" name=""/>
-        <p:cNvGrpSpPr/>
-        <p:nvPr/>
-      </p:nvGrpSpPr>
-      <p:grpSpPr>
-        <a:xfrm>
-          <a:off x="0" y="0"/>
-          <a:ext cx="0" cy="0"/>
-          <a:chOff x="0" y="0"/>
-          <a:chExt cx="0" cy="0"/>
-        </a:xfrm>
-      </p:grpSpPr>
-      <p:sp>
-        <p:nvSpPr>
-          <p:cNvPr id="2" name="Title 1"/>
-          <p:cNvSpPr>
-            <a:spLocks noGrp="1"/>
-          </p:cNvSpPr>
-          <p:nvPr>
-            <p:ph type="title"/>
-          </p:nvPr>
-        </p:nvSpPr>
-        <p:spPr/>
-        <p:txBody>
-          <a:bodyPr>
-            <a:normAutofit fontScale="90000"/>
-          </a:bodyPr>
-          <a:lstStyle/>
-          <a:p>
-            <a:r>
-              <a:rPr lang="en-US" noProof="0" smtClean="0"/>
-              <a:t>Performance Evaluation of SSPayWMN</a:t>
-            </a:r>
-            <a:endParaRPr lang="en-US" noProof="0"/>
-          </a:p>
-        </p:txBody>
-      </p:sp>
-      <p:sp>
-        <p:nvSpPr>
-          <p:cNvPr id="3" name="Content Placeholder 2"/>
-          <p:cNvSpPr>
-            <a:spLocks noGrp="1"/>
-          </p:cNvSpPr>
-          <p:nvPr>
-            <p:ph idx="1"/>
-          </p:nvPr>
-        </p:nvSpPr>
-        <p:spPr/>
-        <p:txBody>
-          <a:bodyPr/>
-          <a:lstStyle/>
-          <a:p>
-            <a:r>
-              <a:rPr lang="en-US" noProof="0" smtClean="0"/>
-              <a:t>The simulations of SSPayWMN are conducted using ns-3.</a:t>
-            </a:r>
-          </a:p>
-          <a:p>
-            <a:r>
-              <a:rPr lang="en-US" noProof="0" smtClean="0"/>
-              <a:t>The simulator was run on a computer with 2.4 GHz Intel Core 2 Duo, 2 GB 1067 MHz DDR3, Apple MacBook OSX v10.6.8.</a:t>
-            </a:r>
-          </a:p>
-          <a:p>
-            <a:endParaRPr lang="en-US" noProof="0"/>
-          </a:p>
-        </p:txBody>
-      </p:sp>
-    </p:spTree>
-  </p:cSld>
-  <p:clrMapOvr>
-    <a:masterClrMapping/>
-  </p:clrMapOvr>
-  <p:timing>
-    <p:tnLst>
-      <p:par>
-        <p:cTn xmlns:p14="http://schemas.microsoft.com/office/powerpoint/2010/main" id="1" dur="indefinite" restart="never" nodeType="tmRoot"/>
+        <p:cTn id="1" dur="indefinite" restart="never" nodeType="tmRoot"/>
       </p:par>
     </p:tnLst>
   </p:timing>
@@ -4375,6 +4352,94 @@
         </p:nvSpPr>
         <p:spPr/>
         <p:txBody>
+          <a:bodyPr>
+            <a:normAutofit fontScale="90000"/>
+          </a:bodyPr>
+          <a:lstStyle/>
+          <a:p>
+            <a:r>
+              <a:rPr lang="en-US" noProof="0" smtClean="0"/>
+              <a:t>Performance Evaluation of SSPayWMN</a:t>
+            </a:r>
+            <a:endParaRPr lang="en-US" noProof="0"/>
+          </a:p>
+        </p:txBody>
+      </p:sp>
+      <p:sp>
+        <p:nvSpPr>
+          <p:cNvPr id="3" name="Content Placeholder 2"/>
+          <p:cNvSpPr>
+            <a:spLocks noGrp="1"/>
+          </p:cNvSpPr>
+          <p:nvPr>
+            <p:ph idx="1"/>
+          </p:nvPr>
+        </p:nvSpPr>
+        <p:spPr/>
+        <p:txBody>
+          <a:bodyPr/>
+          <a:lstStyle/>
+          <a:p>
+            <a:r>
+              <a:rPr lang="en-US" noProof="0" smtClean="0"/>
+              <a:t>The simulations of SSPayWMN are conducted using ns-3.</a:t>
+            </a:r>
+          </a:p>
+          <a:p>
+            <a:r>
+              <a:rPr lang="en-US" noProof="0" smtClean="0"/>
+              <a:t>The simulator was run on a computer with 2.4 GHz Intel Core 2 Duo, 2 GB 1067 MHz DDR3, Apple MacBook OSX v10.6.8.</a:t>
+            </a:r>
+          </a:p>
+          <a:p>
+            <a:endParaRPr lang="en-US" noProof="0"/>
+          </a:p>
+        </p:txBody>
+      </p:sp>
+    </p:spTree>
+  </p:cSld>
+  <p:clrMapOvr>
+    <a:masterClrMapping/>
+  </p:clrMapOvr>
+  <p:timing>
+    <p:tnLst>
+      <p:par>
+        <p:cTn id="1" dur="indefinite" restart="never" nodeType="tmRoot"/>
+      </p:par>
+    </p:tnLst>
+  </p:timing>
+</p:sld>
+</file>
+
+<file path=ppt/slides/slide16.xml><?xml version="1.0" encoding="utf-8"?>
+<p:sld xmlns:a="http://schemas.openxmlformats.org/drawingml/2006/main" xmlns:r="http://schemas.openxmlformats.org/officeDocument/2006/relationships" xmlns:p="http://schemas.openxmlformats.org/presentationml/2006/main">
+  <p:cSld>
+    <p:spTree>
+      <p:nvGrpSpPr>
+        <p:cNvPr id="1" name=""/>
+        <p:cNvGrpSpPr/>
+        <p:nvPr/>
+      </p:nvGrpSpPr>
+      <p:grpSpPr>
+        <a:xfrm>
+          <a:off x="0" y="0"/>
+          <a:ext cx="0" cy="0"/>
+          <a:chOff x="0" y="0"/>
+          <a:chExt cx="0" cy="0"/>
+        </a:xfrm>
+      </p:grpSpPr>
+      <p:sp>
+        <p:nvSpPr>
+          <p:cNvPr id="2" name="Title 1"/>
+          <p:cNvSpPr>
+            <a:spLocks noGrp="1"/>
+          </p:cNvSpPr>
+          <p:nvPr>
+            <p:ph type="title"/>
+          </p:nvPr>
+        </p:nvSpPr>
+        <p:spPr/>
+        <p:txBody>
           <a:bodyPr/>
           <a:lstStyle/>
           <a:p>
@@ -4433,7 +4498,7 @@
           <p:nvPr>
             <p:extLst>
               <p:ext uri="{D42A27DB-BD31-4B8C-83A1-F6EECF244321}">
-                <p14:modId xmlns:p14="http://schemas.microsoft.com/office/powerpoint/2010/main" val="3172586298"/>
+                <p14:modId xmlns:p14="http://schemas.microsoft.com/office/powerpoint/2010/main" xmlns="" val="3172586298"/>
               </p:ext>
             </p:extLst>
           </p:nvPr>
@@ -5036,107 +5101,7 @@
   <p:timing>
     <p:tnLst>
       <p:par>
-        <p:cTn xmlns:p14="http://schemas.microsoft.com/office/powerpoint/2010/main" id="1" dur="indefinite" restart="never" nodeType="tmRoot"/>
-      </p:par>
-    </p:tnLst>
-  </p:timing>
-</p:sld>
-</file>
-
-<file path=ppt/slides/slide16.xml><?xml version="1.0" encoding="utf-8"?>
-<p:sld xmlns:a="http://schemas.openxmlformats.org/drawingml/2006/main" xmlns:r="http://schemas.openxmlformats.org/officeDocument/2006/relationships" xmlns:p="http://schemas.openxmlformats.org/presentationml/2006/main">
-  <p:cSld>
-    <p:spTree>
-      <p:nvGrpSpPr>
-        <p:cNvPr id="1" name=""/>
-        <p:cNvGrpSpPr/>
-        <p:nvPr/>
-      </p:nvGrpSpPr>
-      <p:grpSpPr>
-        <a:xfrm>
-          <a:off x="0" y="0"/>
-          <a:ext cx="0" cy="0"/>
-          <a:chOff x="0" y="0"/>
-          <a:chExt cx="0" cy="0"/>
-        </a:xfrm>
-      </p:grpSpPr>
-      <p:sp>
-        <p:nvSpPr>
-          <p:cNvPr id="2" name="Title 1"/>
-          <p:cNvSpPr>
-            <a:spLocks noGrp="1"/>
-          </p:cNvSpPr>
-          <p:nvPr>
-            <p:ph type="title"/>
-          </p:nvPr>
-        </p:nvSpPr>
-        <p:spPr/>
-        <p:txBody>
-          <a:bodyPr/>
-          <a:lstStyle/>
-          <a:p>
-            <a:r>
-              <a:rPr lang="en-US" noProof="0" smtClean="0"/>
-              <a:t>SSPayWMN Simulations</a:t>
-            </a:r>
-            <a:endParaRPr lang="en-US" noProof="0"/>
-          </a:p>
-        </p:txBody>
-      </p:sp>
-      <p:sp>
-        <p:nvSpPr>
-          <p:cNvPr id="3" name="Content Placeholder 2"/>
-          <p:cNvSpPr>
-            <a:spLocks noGrp="1"/>
-          </p:cNvSpPr>
-          <p:nvPr>
-            <p:ph idx="1"/>
-          </p:nvPr>
-        </p:nvSpPr>
-        <p:spPr/>
-        <p:txBody>
-          <a:bodyPr>
-            <a:normAutofit lnSpcReduction="10000"/>
-          </a:bodyPr>
-          <a:lstStyle/>
-          <a:p>
-            <a:r>
-              <a:rPr lang="en-US" noProof="0" dirty="0" smtClean="0"/>
-              <a:t>We have conducted the simulations of SSPayWMN in two groups.</a:t>
-            </a:r>
-          </a:p>
-          <a:p>
-            <a:r>
-              <a:rPr lang="en-US" noProof="0" dirty="0" smtClean="0"/>
-              <a:t>Unit Tests: </a:t>
-            </a:r>
-            <a:r>
-              <a:rPr lang="en-US" dirty="0" smtClean="0"/>
-              <a:t>Independent </a:t>
-            </a:r>
-            <a:r>
-              <a:rPr lang="en-US" noProof="0" dirty="0" smtClean="0"/>
-              <a:t>protocol runs to analyze the delay caused by protocols.</a:t>
-            </a:r>
-          </a:p>
-          <a:p>
-            <a:r>
-              <a:rPr lang="en-US" noProof="0" dirty="0" smtClean="0"/>
-              <a:t>Real-life Scenario Simulation: These simulations evaluate the system’s overall performance in an ordinary day usage with client mobility and realistic Internet service demand.</a:t>
-            </a:r>
-            <a:endParaRPr lang="en-US" noProof="0" dirty="0"/>
-          </a:p>
-        </p:txBody>
-      </p:sp>
-    </p:spTree>
-  </p:cSld>
-  <p:clrMapOvr>
-    <a:masterClrMapping/>
-  </p:clrMapOvr>
-  <p:timing>
-    <p:tnLst>
-      <p:par>
-        <p:cTn xmlns:p14="http://schemas.microsoft.com/office/powerpoint/2010/main" id="1" dur="indefinite" restart="never" nodeType="tmRoot"/>
+        <p:cTn id="1" dur="indefinite" restart="never" nodeType="tmRoot"/>
       </p:par>
     </p:tnLst>
   </p:timing>
@@ -5177,6 +5142,106 @@
           <a:p>
             <a:r>
               <a:rPr lang="en-US" noProof="0" smtClean="0"/>
+              <a:t>SSPayWMN Simulations</a:t>
+            </a:r>
+            <a:endParaRPr lang="en-US" noProof="0"/>
+          </a:p>
+        </p:txBody>
+      </p:sp>
+      <p:sp>
+        <p:nvSpPr>
+          <p:cNvPr id="3" name="Content Placeholder 2"/>
+          <p:cNvSpPr>
+            <a:spLocks noGrp="1"/>
+          </p:cNvSpPr>
+          <p:nvPr>
+            <p:ph idx="1"/>
+          </p:nvPr>
+        </p:nvSpPr>
+        <p:spPr/>
+        <p:txBody>
+          <a:bodyPr>
+            <a:normAutofit lnSpcReduction="10000"/>
+          </a:bodyPr>
+          <a:lstStyle/>
+          <a:p>
+            <a:r>
+              <a:rPr lang="en-US" noProof="0" dirty="0" smtClean="0"/>
+              <a:t>We have conducted the simulations of SSPayWMN in two groups.</a:t>
+            </a:r>
+          </a:p>
+          <a:p>
+            <a:r>
+              <a:rPr lang="en-US" noProof="0" dirty="0" smtClean="0"/>
+              <a:t>Unit Tests: </a:t>
+            </a:r>
+            <a:r>
+              <a:rPr lang="en-US" dirty="0" smtClean="0"/>
+              <a:t>Independent </a:t>
+            </a:r>
+            <a:r>
+              <a:rPr lang="en-US" noProof="0" dirty="0" smtClean="0"/>
+              <a:t>protocol runs to analyze the delay caused by protocols.</a:t>
+            </a:r>
+          </a:p>
+          <a:p>
+            <a:r>
+              <a:rPr lang="en-US" noProof="0" dirty="0" smtClean="0"/>
+              <a:t>Real-life Scenario Simulation: These simulations evaluate the system’s overall performance in an ordinary day usage with client mobility and realistic Internet service demand.</a:t>
+            </a:r>
+            <a:endParaRPr lang="en-US" noProof="0" dirty="0"/>
+          </a:p>
+        </p:txBody>
+      </p:sp>
+    </p:spTree>
+  </p:cSld>
+  <p:clrMapOvr>
+    <a:masterClrMapping/>
+  </p:clrMapOvr>
+  <p:timing>
+    <p:tnLst>
+      <p:par>
+        <p:cTn id="1" dur="indefinite" restart="never" nodeType="tmRoot"/>
+      </p:par>
+    </p:tnLst>
+  </p:timing>
+</p:sld>
+</file>
+
+<file path=ppt/slides/slide18.xml><?xml version="1.0" encoding="utf-8"?>
+<p:sld xmlns:a="http://schemas.openxmlformats.org/drawingml/2006/main" xmlns:r="http://schemas.openxmlformats.org/officeDocument/2006/relationships" xmlns:p="http://schemas.openxmlformats.org/presentationml/2006/main">
+  <p:cSld>
+    <p:spTree>
+      <p:nvGrpSpPr>
+        <p:cNvPr id="1" name=""/>
+        <p:cNvGrpSpPr/>
+        <p:nvPr/>
+      </p:nvGrpSpPr>
+      <p:grpSpPr>
+        <a:xfrm>
+          <a:off x="0" y="0"/>
+          <a:ext cx="0" cy="0"/>
+          <a:chOff x="0" y="0"/>
+          <a:chExt cx="0" cy="0"/>
+        </a:xfrm>
+      </p:grpSpPr>
+      <p:sp>
+        <p:nvSpPr>
+          <p:cNvPr id="2" name="Title 1"/>
+          <p:cNvSpPr>
+            <a:spLocks noGrp="1"/>
+          </p:cNvSpPr>
+          <p:nvPr>
+            <p:ph type="title"/>
+          </p:nvPr>
+        </p:nvSpPr>
+        <p:spPr/>
+        <p:txBody>
+          <a:bodyPr/>
+          <a:lstStyle/>
+          <a:p>
+            <a:r>
+              <a:rPr lang="en-US" noProof="0" smtClean="0"/>
               <a:t>Unit Test Results</a:t>
             </a:r>
             <a:endParaRPr lang="en-US" noProof="0"/>
@@ -5218,7 +5283,7 @@
           <p:nvPr/>
         </p:nvPicPr>
         <p:blipFill>
-          <a:blip r:embed="rId2"/>
+          <a:blip r:embed="rId2" cstate="print"/>
           <a:srcRect/>
           <a:stretch>
             <a:fillRect/>
@@ -5249,14 +5314,14 @@
   <p:timing>
     <p:tnLst>
       <p:par>
-        <p:cTn xmlns:p14="http://schemas.microsoft.com/office/powerpoint/2010/main" id="1" dur="indefinite" restart="never" nodeType="tmRoot"/>
+        <p:cTn id="1" dur="indefinite" restart="never" nodeType="tmRoot"/>
       </p:par>
     </p:tnLst>
   </p:timing>
 </p:sld>
 </file>
 
-<file path=ppt/slides/slide18.xml><?xml version="1.0" encoding="utf-8"?>
+<file path=ppt/slides/slide19.xml><?xml version="1.0" encoding="utf-8"?>
 <p:sld xmlns:a="http://schemas.openxmlformats.org/drawingml/2006/main" xmlns:r="http://schemas.openxmlformats.org/officeDocument/2006/relationships" xmlns:p="http://schemas.openxmlformats.org/presentationml/2006/main">
   <p:cSld>
     <p:spTree>
@@ -5331,7 +5396,7 @@
           <p:nvPr/>
         </p:nvPicPr>
         <p:blipFill>
-          <a:blip r:embed="rId2"/>
+          <a:blip r:embed="rId2" cstate="print"/>
           <a:srcRect/>
           <a:stretch>
             <a:fillRect/>
@@ -5362,14 +5427,14 @@
   <p:timing>
     <p:tnLst>
       <p:par>
-        <p:cTn xmlns:p14="http://schemas.microsoft.com/office/powerpoint/2010/main" id="1" dur="indefinite" restart="never" nodeType="tmRoot"/>
+        <p:cTn id="1" dur="indefinite" restart="never" nodeType="tmRoot"/>
       </p:par>
     </p:tnLst>
   </p:timing>
 </p:sld>
 </file>
 
-<file path=ppt/slides/slide19.xml><?xml version="1.0" encoding="utf-8"?>
+<file path=ppt/slides/slide2.xml><?xml version="1.0" encoding="utf-8"?>
 <p:sld xmlns:a="http://schemas.openxmlformats.org/drawingml/2006/main" xmlns:r="http://schemas.openxmlformats.org/officeDocument/2006/relationships" xmlns:p="http://schemas.openxmlformats.org/presentationml/2006/main">
   <p:cSld>
     <p:spTree>
@@ -5402,6 +5467,115 @@
           <a:lstStyle/>
           <a:p>
             <a:r>
+              <a:rPr lang="en-US" noProof="0" dirty="0" smtClean="0"/>
+              <a:t>Outline</a:t>
+            </a:r>
+            <a:endParaRPr lang="en-US" noProof="0" dirty="0"/>
+          </a:p>
+        </p:txBody>
+      </p:sp>
+      <p:sp>
+        <p:nvSpPr>
+          <p:cNvPr id="3" name="Content Placeholder 2"/>
+          <p:cNvSpPr>
+            <a:spLocks noGrp="1"/>
+          </p:cNvSpPr>
+          <p:nvPr>
+            <p:ph idx="1"/>
+          </p:nvPr>
+        </p:nvSpPr>
+        <p:spPr/>
+        <p:txBody>
+          <a:bodyPr>
+            <a:normAutofit/>
+          </a:bodyPr>
+          <a:lstStyle/>
+          <a:p>
+            <a:r>
+              <a:rPr lang="en-US" noProof="0" dirty="0" smtClean="0"/>
+              <a:t>Thesis description</a:t>
+            </a:r>
+          </a:p>
+          <a:p>
+            <a:r>
+              <a:rPr lang="en-US" noProof="0" dirty="0" smtClean="0"/>
+              <a:t>Building blocks of the system</a:t>
+            </a:r>
+          </a:p>
+          <a:p>
+            <a:r>
+              <a:rPr lang="en-US" noProof="0" dirty="0" smtClean="0"/>
+              <a:t>Protocol specifications</a:t>
+            </a:r>
+          </a:p>
+          <a:p>
+            <a:r>
+              <a:rPr lang="en-US" noProof="0" dirty="0" smtClean="0"/>
+              <a:t>Simulations of SSPayWMN</a:t>
+            </a:r>
+          </a:p>
+          <a:p>
+            <a:r>
+              <a:rPr lang="en-US" noProof="0" dirty="0" smtClean="0"/>
+              <a:t>Discussion on success of SSPayWMN</a:t>
+            </a:r>
+          </a:p>
+          <a:p>
+            <a:r>
+              <a:rPr lang="en-US" noProof="0" dirty="0" smtClean="0"/>
+              <a:t>Conclusions</a:t>
+            </a:r>
+          </a:p>
+        </p:txBody>
+      </p:sp>
+    </p:spTree>
+  </p:cSld>
+  <p:clrMapOvr>
+    <a:masterClrMapping/>
+  </p:clrMapOvr>
+  <p:timing>
+    <p:tnLst>
+      <p:par>
+        <p:cTn id="1" dur="indefinite" restart="never" nodeType="tmRoot"/>
+      </p:par>
+    </p:tnLst>
+  </p:timing>
+</p:sld>
+</file>
+
+<file path=ppt/slides/slide20.xml><?xml version="1.0" encoding="utf-8"?>
+<p:sld xmlns:a="http://schemas.openxmlformats.org/drawingml/2006/main" xmlns:r="http://schemas.openxmlformats.org/officeDocument/2006/relationships" xmlns:p="http://schemas.openxmlformats.org/presentationml/2006/main">
+  <p:cSld>
+    <p:spTree>
+      <p:nvGrpSpPr>
+        <p:cNvPr id="1" name=""/>
+        <p:cNvGrpSpPr/>
+        <p:nvPr/>
+      </p:nvGrpSpPr>
+      <p:grpSpPr>
+        <a:xfrm>
+          <a:off x="0" y="0"/>
+          <a:ext cx="0" cy="0"/>
+          <a:chOff x="0" y="0"/>
+          <a:chExt cx="0" cy="0"/>
+        </a:xfrm>
+      </p:grpSpPr>
+      <p:sp>
+        <p:nvSpPr>
+          <p:cNvPr id="2" name="Title 1"/>
+          <p:cNvSpPr>
+            <a:spLocks noGrp="1"/>
+          </p:cNvSpPr>
+          <p:nvPr>
+            <p:ph type="title"/>
+          </p:nvPr>
+        </p:nvSpPr>
+        <p:spPr/>
+        <p:txBody>
+          <a:bodyPr/>
+          <a:lstStyle/>
+          <a:p>
+            <a:r>
               <a:rPr lang="en-US" noProof="0" smtClean="0"/>
               <a:t>Unit Test Results</a:t>
             </a:r>
@@ -5446,7 +5620,7 @@
           <p:nvPr/>
         </p:nvPicPr>
         <p:blipFill>
-          <a:blip r:embed="rId2"/>
+          <a:blip r:embed="rId2" cstate="print"/>
           <a:srcRect/>
           <a:stretch>
             <a:fillRect/>
@@ -5477,124 +5651,14 @@
   <p:timing>
     <p:tnLst>
       <p:par>
-        <p:cTn xmlns:p14="http://schemas.microsoft.com/office/powerpoint/2010/main" id="1" dur="indefinite" restart="never" nodeType="tmRoot"/>
+        <p:cTn id="1" dur="indefinite" restart="never" nodeType="tmRoot"/>
       </p:par>
     </p:tnLst>
   </p:timing>
 </p:sld>
 </file>
 
-<file path=ppt/slides/slide2.xml><?xml version="1.0" encoding="utf-8"?>
-<p:sld xmlns:a="http://schemas.openxmlformats.org/drawingml/2006/main" xmlns:r="http://schemas.openxmlformats.org/officeDocument/2006/relationships" xmlns:p="http://schemas.openxmlformats.org/presentationml/2006/main">
-  <p:cSld>
-    <p:spTree>
-      <p:nvGrpSpPr>
-        <p:cNvPr id="1" name=""/>
-        <p:cNvGrpSpPr/>
-        <p:nvPr/>
-      </p:nvGrpSpPr>
-      <p:grpSpPr>
-        <a:xfrm>
-          <a:off x="0" y="0"/>
-          <a:ext cx="0" cy="0"/>
-          <a:chOff x="0" y="0"/>
-          <a:chExt cx="0" cy="0"/>
-        </a:xfrm>
-      </p:grpSpPr>
-      <p:sp>
-        <p:nvSpPr>
-          <p:cNvPr id="2" name="Title 1"/>
-          <p:cNvSpPr>
-            <a:spLocks noGrp="1"/>
-          </p:cNvSpPr>
-          <p:nvPr>
-            <p:ph type="title"/>
-          </p:nvPr>
-        </p:nvSpPr>
-        <p:spPr/>
-        <p:txBody>
-          <a:bodyPr/>
-          <a:lstStyle/>
-          <a:p>
-            <a:r>
-              <a:rPr lang="en-US" noProof="0" dirty="0" smtClean="0"/>
-              <a:t>Outline</a:t>
-            </a:r>
-            <a:endParaRPr lang="en-US" noProof="0" dirty="0"/>
-          </a:p>
-        </p:txBody>
-      </p:sp>
-      <p:sp>
-        <p:nvSpPr>
-          <p:cNvPr id="3" name="Content Placeholder 2"/>
-          <p:cNvSpPr>
-            <a:spLocks noGrp="1"/>
-          </p:cNvSpPr>
-          <p:nvPr>
-            <p:ph idx="1"/>
-          </p:nvPr>
-        </p:nvSpPr>
-        <p:spPr/>
-        <p:txBody>
-          <a:bodyPr>
-            <a:normAutofit/>
-          </a:bodyPr>
-          <a:lstStyle/>
-          <a:p>
-            <a:r>
-              <a:rPr lang="en-US" noProof="0" dirty="0" smtClean="0"/>
-              <a:t>Thesis description</a:t>
-            </a:r>
-          </a:p>
-          <a:p>
-            <a:r>
-              <a:rPr lang="en-US" noProof="0" dirty="0" smtClean="0"/>
-              <a:t>Building blocks of the system</a:t>
-            </a:r>
-          </a:p>
-          <a:p>
-            <a:r>
-              <a:rPr lang="en-US" noProof="0" dirty="0" smtClean="0"/>
-              <a:t>Protocol specifications</a:t>
-            </a:r>
-          </a:p>
-          <a:p>
-            <a:r>
-              <a:rPr lang="en-US" noProof="0" dirty="0" smtClean="0"/>
-              <a:t>Simulations of SSPayWMN</a:t>
-            </a:r>
-            <a:endParaRPr lang="en-US" noProof="0" dirty="0" smtClean="0"/>
-          </a:p>
-          <a:p>
-            <a:r>
-              <a:rPr lang="en-US" noProof="0" dirty="0" smtClean="0"/>
-              <a:t>Discussion on success of SSPayWMN</a:t>
-            </a:r>
-          </a:p>
-          <a:p>
-            <a:r>
-              <a:rPr lang="en-US" noProof="0" dirty="0" smtClean="0"/>
-              <a:t>Conclusions</a:t>
-            </a:r>
-          </a:p>
-        </p:txBody>
-      </p:sp>
-    </p:spTree>
-  </p:cSld>
-  <p:clrMapOvr>
-    <a:masterClrMapping/>
-  </p:clrMapOvr>
-  <p:timing>
-    <p:tnLst>
-      <p:par>
-        <p:cTn xmlns:p14="http://schemas.microsoft.com/office/powerpoint/2010/main" id="1" dur="indefinite" restart="never" nodeType="tmRoot"/>
-      </p:par>
-    </p:tnLst>
-  </p:timing>
-</p:sld>
-</file>
-
-<file path=ppt/slides/slide20.xml><?xml version="1.0" encoding="utf-8"?>
+<file path=ppt/slides/slide21.xml><?xml version="1.0" encoding="utf-8"?>
 <p:sld xmlns:a="http://schemas.openxmlformats.org/drawingml/2006/main" xmlns:r="http://schemas.openxmlformats.org/officeDocument/2006/relationships" xmlns:p="http://schemas.openxmlformats.org/presentationml/2006/main">
   <p:cSld>
     <p:spTree>
@@ -5700,14 +5764,14 @@
   <p:timing>
     <p:tnLst>
       <p:par>
-        <p:cTn xmlns:p14="http://schemas.microsoft.com/office/powerpoint/2010/main" id="1" dur="indefinite" restart="never" nodeType="tmRoot"/>
+        <p:cTn id="1" dur="indefinite" restart="never" nodeType="tmRoot"/>
       </p:par>
     </p:tnLst>
   </p:timing>
 </p:sld>
 </file>
 
-<file path=ppt/slides/slide21.xml><?xml version="1.0" encoding="utf-8"?>
+<file path=ppt/slides/slide22.xml><?xml version="1.0" encoding="utf-8"?>
 <p:sld xmlns:a="http://schemas.openxmlformats.org/drawingml/2006/main" xmlns:r="http://schemas.openxmlformats.org/officeDocument/2006/relationships" xmlns:p="http://schemas.openxmlformats.org/presentationml/2006/main">
   <p:cSld>
     <p:spTree>
@@ -5736,182 +5800,59 @@
         </p:nvSpPr>
         <p:spPr/>
         <p:txBody>
+          <a:bodyPr/>
+          <a:lstStyle/>
+          <a:p>
+            <a:r>
+              <a:rPr lang="en-US" noProof="0" smtClean="0"/>
+              <a:t>Client Types</a:t>
+            </a:r>
+            <a:endParaRPr lang="en-US" noProof="0"/>
+          </a:p>
+        </p:txBody>
+      </p:sp>
+      <p:sp>
+        <p:nvSpPr>
+          <p:cNvPr id="3" name="Content Placeholder 2"/>
+          <p:cNvSpPr>
+            <a:spLocks noGrp="1"/>
+          </p:cNvSpPr>
+          <p:nvPr>
+            <p:ph idx="1"/>
+          </p:nvPr>
+        </p:nvSpPr>
+        <p:spPr/>
+        <p:txBody>
           <a:bodyPr>
-            <a:normAutofit fontScale="90000"/>
+            <a:normAutofit/>
           </a:bodyPr>
           <a:lstStyle/>
           <a:p>
             <a:r>
-              <a:rPr lang="en-US" noProof="0" smtClean="0"/>
-              <a:t>User Modeling and Mobility in </a:t>
-            </a:r>
-            <a:br>
-              <a:rPr lang="en-US" noProof="0" smtClean="0"/>
-            </a:br>
-            <a:r>
-              <a:rPr lang="en-US" noProof="0" smtClean="0"/>
-              <a:t>Real-Life Scenario</a:t>
-            </a:r>
-            <a:endParaRPr lang="en-US" noProof="0"/>
-          </a:p>
-        </p:txBody>
-      </p:sp>
-      <p:sp>
-        <p:nvSpPr>
-          <p:cNvPr id="3" name="Content Placeholder 2"/>
-          <p:cNvSpPr>
-            <a:spLocks noGrp="1"/>
-          </p:cNvSpPr>
-          <p:nvPr>
-            <p:ph idx="1"/>
-          </p:nvPr>
-        </p:nvSpPr>
-        <p:spPr/>
-        <p:txBody>
-          <a:bodyPr>
-            <a:normAutofit fontScale="77500" lnSpcReduction="20000"/>
-          </a:bodyPr>
-          <a:lstStyle/>
-          <a:p>
-            <a:r>
               <a:rPr lang="en-US" noProof="0" dirty="0" smtClean="0"/>
-              <a:t>The proposed system intends to serve a variety of users. </a:t>
-            </a:r>
-          </a:p>
-          <a:p>
-            <a:r>
-              <a:rPr lang="en-US" dirty="0" smtClean="0"/>
-              <a:t>Clients perform certain kinds of actions and </a:t>
-            </a:r>
-            <a:r>
-              <a:rPr lang="en-US" dirty="0"/>
-              <a:t>a</a:t>
-            </a:r>
-            <a:r>
-              <a:rPr lang="en-US" noProof="0" dirty="0" err="1" smtClean="0"/>
-              <a:t>ll</a:t>
-            </a:r>
+              <a:t>Three different user types are outlined with different networking and mobility requirements.</a:t>
+            </a:r>
+          </a:p>
+          <a:p>
+            <a:pPr lvl="1"/>
             <a:r>
               <a:rPr lang="en-US" noProof="0" dirty="0" smtClean="0"/>
-              <a:t> of these actions are triggered as a result of a random event.</a:t>
-            </a:r>
-          </a:p>
-          <a:p>
-            <a:pPr marL="0" indent="0" algn="ctr">
-              <a:buNone/>
-            </a:pPr>
-            <a:endParaRPr lang="en-US" i="1" dirty="0" smtClean="0"/>
-          </a:p>
-          <a:p>
-            <a:pPr marL="0" indent="0" algn="ctr">
-              <a:buNone/>
-            </a:pPr>
-            <a:r>
-              <a:rPr lang="en-US" i="1" dirty="0" err="1" smtClean="0"/>
-              <a:t>beco</a:t>
-            </a:r>
-            <a:r>
-              <a:rPr lang="en-US" i="1" dirty="0" smtClean="0"/>
-              <a:t>𝑚</a:t>
-            </a:r>
-            <a:r>
-              <a:rPr lang="en-US" i="1" dirty="0" err="1" smtClean="0"/>
-              <a:t>eActiveProb</a:t>
-            </a:r>
-            <a:r>
-              <a:rPr lang="en-US" i="1" dirty="0"/>
-              <a:t>&lt;Domestic&gt;  = {0.40, 0.60, 0.60};</a:t>
-            </a:r>
-            <a:endParaRPr lang="en-US" dirty="0"/>
-          </a:p>
-          <a:p>
-            <a:pPr marL="0" indent="0" algn="ctr">
-              <a:buNone/>
-            </a:pPr>
-            <a:r>
-              <a:rPr lang="en-US" i="1" dirty="0" err="1"/>
-              <a:t>becomeActiveProb</a:t>
-            </a:r>
-            <a:r>
-              <a:rPr lang="en-US" i="1" dirty="0"/>
-              <a:t>&lt;Student&gt;  = {0.20, 0.20, 0.80};</a:t>
-            </a:r>
-            <a:endParaRPr lang="en-US" dirty="0"/>
-          </a:p>
-          <a:p>
-            <a:pPr marL="0" indent="0" algn="ctr">
-              <a:buNone/>
-            </a:pPr>
-            <a:r>
-              <a:rPr lang="en-US" i="1" dirty="0" err="1"/>
-              <a:t>becomeActiveProb</a:t>
-            </a:r>
-            <a:r>
-              <a:rPr lang="en-US" i="1" dirty="0"/>
-              <a:t>&lt;Employee&gt;  = {0.20, 0.99, 0.20};</a:t>
-            </a:r>
-            <a:endParaRPr lang="en-US" dirty="0"/>
-          </a:p>
-          <a:p>
-            <a:pPr marL="0" indent="0" algn="ctr">
-              <a:buNone/>
-            </a:pPr>
-            <a:r>
-              <a:rPr lang="en-US" dirty="0"/>
-              <a:t> </a:t>
-            </a:r>
-          </a:p>
-          <a:p>
-            <a:pPr marL="0" indent="0" algn="ctr">
-              <a:buNone/>
-            </a:pPr>
-            <a:r>
-              <a:rPr lang="en-US" i="1" dirty="0" err="1"/>
-              <a:t>stayActiveProb</a:t>
-            </a:r>
-            <a:r>
-              <a:rPr lang="en-US" i="1" dirty="0"/>
-              <a:t>&lt;</a:t>
-            </a:r>
-            <a:r>
-              <a:rPr lang="en-US" i="1" dirty="0" err="1"/>
-              <a:t>Domesti</a:t>
-            </a:r>
-            <a:r>
-              <a:rPr lang="en-US" i="1" dirty="0"/>
-              <a:t>𝑐&gt;  = {0.90, 0.98, 0.80};</a:t>
-            </a:r>
-            <a:endParaRPr lang="en-US" dirty="0"/>
-          </a:p>
-          <a:p>
-            <a:pPr marL="0" indent="0" algn="ctr">
-              <a:buNone/>
-            </a:pPr>
-            <a:r>
-              <a:rPr lang="en-US" i="1" dirty="0" err="1"/>
-              <a:t>stayActiveProb</a:t>
-            </a:r>
-            <a:r>
-              <a:rPr lang="en-US" i="1" dirty="0"/>
-              <a:t>&lt;Student&gt; = {0.30, 0.20, 0.98};</a:t>
-            </a:r>
-            <a:endParaRPr lang="en-US" dirty="0"/>
-          </a:p>
-          <a:p>
-            <a:pPr marL="0" indent="0" algn="ctr">
-              <a:buNone/>
-            </a:pPr>
-            <a:r>
-              <a:rPr lang="en-US" i="1" dirty="0" err="1"/>
-              <a:t>stayActiveProb</a:t>
-            </a:r>
-            <a:r>
-              <a:rPr lang="en-US" i="1" dirty="0"/>
-              <a:t>&lt;Employee&gt;  = {0.30, 0.99, 0.20};</a:t>
-            </a:r>
-            <a:endParaRPr lang="en-US" dirty="0"/>
-          </a:p>
-          <a:p>
+              <a:t>Students</a:t>
+            </a:r>
+          </a:p>
+          <a:p>
+            <a:pPr lvl="1"/>
+            <a:r>
+              <a:rPr lang="en-US" noProof="0" dirty="0" smtClean="0"/>
+              <a:t>Employees</a:t>
+            </a:r>
+          </a:p>
+          <a:p>
+            <a:pPr lvl="1"/>
+            <a:r>
+              <a:rPr lang="en-US" noProof="0" dirty="0" smtClean="0"/>
+              <a:t>Domestics</a:t>
+            </a:r>
             <a:endParaRPr lang="en-US" noProof="0" dirty="0"/>
           </a:p>
         </p:txBody>
@@ -5924,14 +5865,722 @@
   <p:timing>
     <p:tnLst>
       <p:par>
-        <p:cTn xmlns:p14="http://schemas.microsoft.com/office/powerpoint/2010/main" id="1" dur="indefinite" restart="never" nodeType="tmRoot"/>
+        <p:cTn id="1" dur="indefinite" restart="never" nodeType="tmRoot"/>
       </p:par>
     </p:tnLst>
   </p:timing>
 </p:sld>
 </file>
 
-<file path=ppt/slides/slide22.xml><?xml version="1.0" encoding="utf-8"?>
+<file path=ppt/slides/slide23.xml><?xml version="1.0" encoding="utf-8"?>
+<p:sld xmlns:a="http://schemas.openxmlformats.org/drawingml/2006/main" xmlns:r="http://schemas.openxmlformats.org/officeDocument/2006/relationships" xmlns:p="http://schemas.openxmlformats.org/presentationml/2006/main">
+  <p:cSld>
+    <p:spTree>
+      <p:nvGrpSpPr>
+        <p:cNvPr id="1" name=""/>
+        <p:cNvGrpSpPr/>
+        <p:nvPr/>
+      </p:nvGrpSpPr>
+      <p:grpSpPr>
+        <a:xfrm>
+          <a:off x="0" y="0"/>
+          <a:ext cx="0" cy="0"/>
+          <a:chOff x="0" y="0"/>
+          <a:chExt cx="0" cy="0"/>
+        </a:xfrm>
+      </p:grpSpPr>
+      <p:sp>
+        <p:nvSpPr>
+          <p:cNvPr id="2" name="Title 1"/>
+          <p:cNvSpPr>
+            <a:spLocks noGrp="1"/>
+          </p:cNvSpPr>
+          <p:nvPr>
+            <p:ph type="title"/>
+          </p:nvPr>
+        </p:nvSpPr>
+        <p:spPr/>
+        <p:txBody>
+          <a:bodyPr>
+            <a:normAutofit fontScale="90000"/>
+          </a:bodyPr>
+          <a:lstStyle/>
+          <a:p>
+            <a:r>
+              <a:rPr lang="en-US" noProof="0" smtClean="0"/>
+              <a:t>User Modeling and Mobility in </a:t>
+            </a:r>
+            <a:br>
+              <a:rPr lang="en-US" noProof="0" smtClean="0"/>
+            </a:br>
+            <a:r>
+              <a:rPr lang="en-US" noProof="0" smtClean="0"/>
+              <a:t>Real-Life Scenario</a:t>
+            </a:r>
+            <a:endParaRPr lang="en-US" noProof="0"/>
+          </a:p>
+        </p:txBody>
+      </p:sp>
+      <p:sp>
+        <p:nvSpPr>
+          <p:cNvPr id="3" name="Content Placeholder 2"/>
+          <p:cNvSpPr>
+            <a:spLocks noGrp="1"/>
+          </p:cNvSpPr>
+          <p:nvPr>
+            <p:ph idx="1"/>
+          </p:nvPr>
+        </p:nvSpPr>
+        <p:spPr>
+          <a:xfrm>
+            <a:off x="457200" y="1600200"/>
+            <a:ext cx="8229600" cy="1900237"/>
+          </a:xfrm>
+        </p:spPr>
+        <p:txBody>
+          <a:bodyPr>
+            <a:normAutofit fontScale="77500" lnSpcReduction="20000"/>
+          </a:bodyPr>
+          <a:lstStyle/>
+          <a:p>
+            <a:r>
+              <a:rPr lang="en-US" noProof="0" dirty="0" smtClean="0"/>
+              <a:t>The proposed system intends to serve a variety of users. </a:t>
+            </a:r>
+          </a:p>
+          <a:p>
+            <a:r>
+              <a:rPr lang="en-US" dirty="0" smtClean="0"/>
+              <a:t>Clients perform certain kinds of actions and </a:t>
+            </a:r>
+            <a:r>
+              <a:rPr lang="en-US" dirty="0"/>
+              <a:t>a</a:t>
+            </a:r>
+            <a:r>
+              <a:rPr lang="en-US" noProof="0" dirty="0" err="1" smtClean="0"/>
+              <a:t>ll</a:t>
+            </a:r>
+            <a:r>
+              <a:rPr lang="en-US" noProof="0" dirty="0" smtClean="0"/>
+              <a:t> of these actions are triggered as a result of a random event.</a:t>
+            </a:r>
+          </a:p>
+          <a:p>
+            <a:pPr marL="0" indent="0" algn="ctr">
+              <a:buNone/>
+            </a:pPr>
+            <a:r>
+              <a:rPr lang="en-US" dirty="0"/>
+              <a:t> </a:t>
+            </a:r>
+          </a:p>
+        </p:txBody>
+      </p:sp>
+      <p:graphicFrame>
+        <p:nvGraphicFramePr>
+          <p:cNvPr id="4" name="Table 3"/>
+          <p:cNvGraphicFramePr>
+            <a:graphicFrameLocks noGrp="1"/>
+          </p:cNvGraphicFramePr>
+          <p:nvPr/>
+        </p:nvGraphicFramePr>
+        <p:xfrm>
+          <a:off x="2500298" y="2857496"/>
+          <a:ext cx="6096000" cy="1483360"/>
+        </p:xfrm>
+        <a:graphic>
+          <a:graphicData uri="http://schemas.openxmlformats.org/drawingml/2006/table">
+            <a:tbl>
+              <a:tblPr firstRow="1" bandRow="1">
+                <a:tableStyleId>{5C22544A-7EE6-4342-B048-85BDC9FD1C3A}</a:tableStyleId>
+              </a:tblPr>
+              <a:tblGrid>
+                <a:gridCol w="1524000"/>
+                <a:gridCol w="1524000"/>
+                <a:gridCol w="1524000"/>
+                <a:gridCol w="1524000"/>
+              </a:tblGrid>
+              <a:tr h="370840">
+                <a:tc>
+                  <a:txBody>
+                    <a:bodyPr/>
+                    <a:lstStyle/>
+                    <a:p>
+                      <a:endParaRPr lang="en-US" dirty="0"/>
+                    </a:p>
+                  </a:txBody>
+                  <a:tcPr/>
+                </a:tc>
+                <a:tc>
+                  <a:txBody>
+                    <a:bodyPr/>
+                    <a:lstStyle/>
+                    <a:p>
+                      <a:r>
+                        <a:rPr lang="tr-TR" dirty="0" smtClean="0"/>
+                        <a:t>Morning</a:t>
+                      </a:r>
+                      <a:endParaRPr lang="en-US" dirty="0"/>
+                    </a:p>
+                  </a:txBody>
+                  <a:tcPr/>
+                </a:tc>
+                <a:tc>
+                  <a:txBody>
+                    <a:bodyPr/>
+                    <a:lstStyle/>
+                    <a:p>
+                      <a:r>
+                        <a:rPr lang="tr-TR" dirty="0" smtClean="0"/>
+                        <a:t>Daytime</a:t>
+                      </a:r>
+                      <a:endParaRPr lang="en-US" dirty="0"/>
+                    </a:p>
+                  </a:txBody>
+                  <a:tcPr/>
+                </a:tc>
+                <a:tc>
+                  <a:txBody>
+                    <a:bodyPr/>
+                    <a:lstStyle/>
+                    <a:p>
+                      <a:r>
+                        <a:rPr lang="tr-TR" dirty="0" smtClean="0"/>
+                        <a:t>Evening</a:t>
+                      </a:r>
+                      <a:endParaRPr lang="en-US" dirty="0"/>
+                    </a:p>
+                  </a:txBody>
+                  <a:tcPr/>
+                </a:tc>
+              </a:tr>
+              <a:tr h="370840">
+                <a:tc>
+                  <a:txBody>
+                    <a:bodyPr/>
+                    <a:lstStyle/>
+                    <a:p>
+                      <a:r>
+                        <a:rPr lang="tr-TR" dirty="0" smtClean="0"/>
+                        <a:t>Domestics</a:t>
+                      </a:r>
+                      <a:endParaRPr lang="en-US" dirty="0"/>
+                    </a:p>
+                  </a:txBody>
+                  <a:tcPr/>
+                </a:tc>
+                <a:tc>
+                  <a:txBody>
+                    <a:bodyPr/>
+                    <a:lstStyle/>
+                    <a:p>
+                      <a:r>
+                        <a:rPr lang="tr-TR" dirty="0" smtClean="0"/>
+                        <a:t>0,40</a:t>
+                      </a:r>
+                      <a:endParaRPr lang="en-US" dirty="0"/>
+                    </a:p>
+                  </a:txBody>
+                  <a:tcPr/>
+                </a:tc>
+                <a:tc>
+                  <a:txBody>
+                    <a:bodyPr/>
+                    <a:lstStyle/>
+                    <a:p>
+                      <a:r>
+                        <a:rPr lang="tr-TR" dirty="0" smtClean="0"/>
+                        <a:t>0,60</a:t>
+                      </a:r>
+                      <a:endParaRPr lang="en-US" dirty="0"/>
+                    </a:p>
+                  </a:txBody>
+                  <a:tcPr/>
+                </a:tc>
+                <a:tc>
+                  <a:txBody>
+                    <a:bodyPr/>
+                    <a:lstStyle/>
+                    <a:p>
+                      <a:r>
+                        <a:rPr lang="tr-TR" dirty="0" smtClean="0"/>
+                        <a:t>0,60</a:t>
+                      </a:r>
+                      <a:endParaRPr lang="en-US" dirty="0"/>
+                    </a:p>
+                  </a:txBody>
+                  <a:tcPr/>
+                </a:tc>
+              </a:tr>
+              <a:tr h="370840">
+                <a:tc>
+                  <a:txBody>
+                    <a:bodyPr/>
+                    <a:lstStyle/>
+                    <a:p>
+                      <a:r>
+                        <a:rPr lang="tr-TR" dirty="0" smtClean="0"/>
+                        <a:t>Students</a:t>
+                      </a:r>
+                      <a:endParaRPr lang="en-US" dirty="0"/>
+                    </a:p>
+                  </a:txBody>
+                  <a:tcPr/>
+                </a:tc>
+                <a:tc>
+                  <a:txBody>
+                    <a:bodyPr/>
+                    <a:lstStyle/>
+                    <a:p>
+                      <a:r>
+                        <a:rPr lang="tr-TR" dirty="0" smtClean="0"/>
+                        <a:t>0,20</a:t>
+                      </a:r>
+                      <a:endParaRPr lang="en-US" dirty="0"/>
+                    </a:p>
+                  </a:txBody>
+                  <a:tcPr/>
+                </a:tc>
+                <a:tc>
+                  <a:txBody>
+                    <a:bodyPr/>
+                    <a:lstStyle/>
+                    <a:p>
+                      <a:r>
+                        <a:rPr lang="tr-TR" dirty="0" smtClean="0"/>
+                        <a:t>0,20</a:t>
+                      </a:r>
+                      <a:endParaRPr lang="en-US" dirty="0"/>
+                    </a:p>
+                  </a:txBody>
+                  <a:tcPr/>
+                </a:tc>
+                <a:tc>
+                  <a:txBody>
+                    <a:bodyPr/>
+                    <a:lstStyle/>
+                    <a:p>
+                      <a:r>
+                        <a:rPr lang="tr-TR" dirty="0" smtClean="0"/>
+                        <a:t>0,80</a:t>
+                      </a:r>
+                      <a:endParaRPr lang="en-US" dirty="0"/>
+                    </a:p>
+                  </a:txBody>
+                  <a:tcPr/>
+                </a:tc>
+              </a:tr>
+              <a:tr h="370840">
+                <a:tc>
+                  <a:txBody>
+                    <a:bodyPr/>
+                    <a:lstStyle/>
+                    <a:p>
+                      <a:r>
+                        <a:rPr lang="tr-TR" dirty="0" smtClean="0"/>
+                        <a:t>Employees</a:t>
+                      </a:r>
+                      <a:endParaRPr lang="en-US" dirty="0"/>
+                    </a:p>
+                  </a:txBody>
+                  <a:tcPr/>
+                </a:tc>
+                <a:tc>
+                  <a:txBody>
+                    <a:bodyPr/>
+                    <a:lstStyle/>
+                    <a:p>
+                      <a:r>
+                        <a:rPr lang="tr-TR" dirty="0" smtClean="0"/>
+                        <a:t>0,20</a:t>
+                      </a:r>
+                      <a:endParaRPr lang="en-US" dirty="0"/>
+                    </a:p>
+                  </a:txBody>
+                  <a:tcPr/>
+                </a:tc>
+                <a:tc>
+                  <a:txBody>
+                    <a:bodyPr/>
+                    <a:lstStyle/>
+                    <a:p>
+                      <a:r>
+                        <a:rPr lang="tr-TR" dirty="0" smtClean="0"/>
+                        <a:t>0,99</a:t>
+                      </a:r>
+                      <a:endParaRPr lang="en-US" dirty="0"/>
+                    </a:p>
+                  </a:txBody>
+                  <a:tcPr/>
+                </a:tc>
+                <a:tc>
+                  <a:txBody>
+                    <a:bodyPr/>
+                    <a:lstStyle/>
+                    <a:p>
+                      <a:r>
+                        <a:rPr lang="tr-TR" dirty="0" smtClean="0"/>
+                        <a:t>0,20</a:t>
+                      </a:r>
+                      <a:endParaRPr lang="en-US" dirty="0"/>
+                    </a:p>
+                  </a:txBody>
+                  <a:tcPr/>
+                </a:tc>
+              </a:tr>
+            </a:tbl>
+          </a:graphicData>
+        </a:graphic>
+      </p:graphicFrame>
+      <p:graphicFrame>
+        <p:nvGraphicFramePr>
+          <p:cNvPr id="5" name="Table 4"/>
+          <p:cNvGraphicFramePr>
+            <a:graphicFrameLocks noGrp="1"/>
+          </p:cNvGraphicFramePr>
+          <p:nvPr/>
+        </p:nvGraphicFramePr>
+        <p:xfrm>
+          <a:off x="2547966" y="4714884"/>
+          <a:ext cx="6096000" cy="1483360"/>
+        </p:xfrm>
+        <a:graphic>
+          <a:graphicData uri="http://schemas.openxmlformats.org/drawingml/2006/table">
+            <a:tbl>
+              <a:tblPr firstRow="1" bandRow="1">
+                <a:tableStyleId>{5C22544A-7EE6-4342-B048-85BDC9FD1C3A}</a:tableStyleId>
+              </a:tblPr>
+              <a:tblGrid>
+                <a:gridCol w="1524000"/>
+                <a:gridCol w="1524000"/>
+                <a:gridCol w="1524000"/>
+                <a:gridCol w="1524000"/>
+              </a:tblGrid>
+              <a:tr h="370840">
+                <a:tc>
+                  <a:txBody>
+                    <a:bodyPr/>
+                    <a:lstStyle/>
+                    <a:p>
+                      <a:endParaRPr lang="en-US" dirty="0"/>
+                    </a:p>
+                  </a:txBody>
+                  <a:tcPr/>
+                </a:tc>
+                <a:tc>
+                  <a:txBody>
+                    <a:bodyPr/>
+                    <a:lstStyle/>
+                    <a:p>
+                      <a:r>
+                        <a:rPr lang="tr-TR" dirty="0" smtClean="0"/>
+                        <a:t>Morning</a:t>
+                      </a:r>
+                      <a:endParaRPr lang="en-US" dirty="0"/>
+                    </a:p>
+                  </a:txBody>
+                  <a:tcPr/>
+                </a:tc>
+                <a:tc>
+                  <a:txBody>
+                    <a:bodyPr/>
+                    <a:lstStyle/>
+                    <a:p>
+                      <a:r>
+                        <a:rPr lang="tr-TR" dirty="0" smtClean="0"/>
+                        <a:t>Daytime</a:t>
+                      </a:r>
+                      <a:endParaRPr lang="en-US" dirty="0"/>
+                    </a:p>
+                  </a:txBody>
+                  <a:tcPr/>
+                </a:tc>
+                <a:tc>
+                  <a:txBody>
+                    <a:bodyPr/>
+                    <a:lstStyle/>
+                    <a:p>
+                      <a:r>
+                        <a:rPr lang="tr-TR" dirty="0" smtClean="0"/>
+                        <a:t>Evening</a:t>
+                      </a:r>
+                      <a:endParaRPr lang="en-US" dirty="0"/>
+                    </a:p>
+                  </a:txBody>
+                  <a:tcPr/>
+                </a:tc>
+              </a:tr>
+              <a:tr h="370840">
+                <a:tc>
+                  <a:txBody>
+                    <a:bodyPr/>
+                    <a:lstStyle/>
+                    <a:p>
+                      <a:r>
+                        <a:rPr lang="tr-TR" dirty="0" smtClean="0"/>
+                        <a:t>Domestics</a:t>
+                      </a:r>
+                      <a:endParaRPr lang="en-US" dirty="0"/>
+                    </a:p>
+                  </a:txBody>
+                  <a:tcPr/>
+                </a:tc>
+                <a:tc>
+                  <a:txBody>
+                    <a:bodyPr/>
+                    <a:lstStyle/>
+                    <a:p>
+                      <a:r>
+                        <a:rPr lang="tr-TR" dirty="0" smtClean="0"/>
+                        <a:t>0,90</a:t>
+                      </a:r>
+                      <a:endParaRPr lang="en-US" dirty="0"/>
+                    </a:p>
+                  </a:txBody>
+                  <a:tcPr/>
+                </a:tc>
+                <a:tc>
+                  <a:txBody>
+                    <a:bodyPr/>
+                    <a:lstStyle/>
+                    <a:p>
+                      <a:r>
+                        <a:rPr lang="tr-TR" dirty="0" smtClean="0"/>
+                        <a:t>0,98</a:t>
+                      </a:r>
+                      <a:endParaRPr lang="en-US" dirty="0"/>
+                    </a:p>
+                  </a:txBody>
+                  <a:tcPr/>
+                </a:tc>
+                <a:tc>
+                  <a:txBody>
+                    <a:bodyPr/>
+                    <a:lstStyle/>
+                    <a:p>
+                      <a:r>
+                        <a:rPr lang="tr-TR" dirty="0" smtClean="0"/>
+                        <a:t>0,80</a:t>
+                      </a:r>
+                      <a:endParaRPr lang="en-US" dirty="0"/>
+                    </a:p>
+                  </a:txBody>
+                  <a:tcPr/>
+                </a:tc>
+              </a:tr>
+              <a:tr h="370840">
+                <a:tc>
+                  <a:txBody>
+                    <a:bodyPr/>
+                    <a:lstStyle/>
+                    <a:p>
+                      <a:r>
+                        <a:rPr lang="tr-TR" dirty="0" smtClean="0"/>
+                        <a:t>Students</a:t>
+                      </a:r>
+                      <a:endParaRPr lang="en-US" dirty="0"/>
+                    </a:p>
+                  </a:txBody>
+                  <a:tcPr/>
+                </a:tc>
+                <a:tc>
+                  <a:txBody>
+                    <a:bodyPr/>
+                    <a:lstStyle/>
+                    <a:p>
+                      <a:r>
+                        <a:rPr lang="tr-TR" dirty="0" smtClean="0"/>
+                        <a:t>0,30</a:t>
+                      </a:r>
+                      <a:endParaRPr lang="en-US" dirty="0"/>
+                    </a:p>
+                  </a:txBody>
+                  <a:tcPr/>
+                </a:tc>
+                <a:tc>
+                  <a:txBody>
+                    <a:bodyPr/>
+                    <a:lstStyle/>
+                    <a:p>
+                      <a:r>
+                        <a:rPr lang="tr-TR" dirty="0" smtClean="0"/>
+                        <a:t>0,20</a:t>
+                      </a:r>
+                      <a:endParaRPr lang="en-US" dirty="0"/>
+                    </a:p>
+                  </a:txBody>
+                  <a:tcPr/>
+                </a:tc>
+                <a:tc>
+                  <a:txBody>
+                    <a:bodyPr/>
+                    <a:lstStyle/>
+                    <a:p>
+                      <a:r>
+                        <a:rPr lang="tr-TR" dirty="0" smtClean="0"/>
+                        <a:t>0,98</a:t>
+                      </a:r>
+                      <a:endParaRPr lang="en-US" dirty="0"/>
+                    </a:p>
+                  </a:txBody>
+                  <a:tcPr/>
+                </a:tc>
+              </a:tr>
+              <a:tr h="370840">
+                <a:tc>
+                  <a:txBody>
+                    <a:bodyPr/>
+                    <a:lstStyle/>
+                    <a:p>
+                      <a:r>
+                        <a:rPr lang="tr-TR" dirty="0" smtClean="0"/>
+                        <a:t>Employees</a:t>
+                      </a:r>
+                      <a:endParaRPr lang="en-US" dirty="0"/>
+                    </a:p>
+                  </a:txBody>
+                  <a:tcPr/>
+                </a:tc>
+                <a:tc>
+                  <a:txBody>
+                    <a:bodyPr/>
+                    <a:lstStyle/>
+                    <a:p>
+                      <a:r>
+                        <a:rPr lang="tr-TR" dirty="0" smtClean="0"/>
+                        <a:t>0,30</a:t>
+                      </a:r>
+                      <a:endParaRPr lang="en-US" dirty="0"/>
+                    </a:p>
+                  </a:txBody>
+                  <a:tcPr/>
+                </a:tc>
+                <a:tc>
+                  <a:txBody>
+                    <a:bodyPr/>
+                    <a:lstStyle/>
+                    <a:p>
+                      <a:r>
+                        <a:rPr lang="tr-TR" dirty="0" smtClean="0"/>
+                        <a:t>0,99</a:t>
+                      </a:r>
+                      <a:endParaRPr lang="en-US" dirty="0"/>
+                    </a:p>
+                  </a:txBody>
+                  <a:tcPr/>
+                </a:tc>
+                <a:tc>
+                  <a:txBody>
+                    <a:bodyPr/>
+                    <a:lstStyle/>
+                    <a:p>
+                      <a:r>
+                        <a:rPr lang="tr-TR" dirty="0" smtClean="0"/>
+                        <a:t>0,20</a:t>
+                      </a:r>
+                      <a:endParaRPr lang="en-US" dirty="0"/>
+                    </a:p>
+                  </a:txBody>
+                  <a:tcPr/>
+                </a:tc>
+              </a:tr>
+            </a:tbl>
+          </a:graphicData>
+        </a:graphic>
+      </p:graphicFrame>
+      <p:sp>
+        <p:nvSpPr>
+          <p:cNvPr id="6" name="TextBox 5"/>
+          <p:cNvSpPr txBox="1"/>
+          <p:nvPr/>
+        </p:nvSpPr>
+        <p:spPr>
+          <a:xfrm>
+            <a:off x="785786" y="3357562"/>
+            <a:ext cx="1626407" cy="646331"/>
+          </a:xfrm>
+          <a:prstGeom prst="rect">
+            <a:avLst/>
+          </a:prstGeom>
+          <a:noFill/>
+        </p:spPr>
+        <p:txBody>
+          <a:bodyPr wrap="none" rtlCol="0">
+            <a:spAutoFit/>
+          </a:bodyPr>
+          <a:lstStyle/>
+          <a:p>
+            <a:pPr algn="ctr"/>
+            <a:r>
+              <a:rPr lang="tr-TR" dirty="0" smtClean="0"/>
+              <a:t>Become Active </a:t>
+            </a:r>
+          </a:p>
+          <a:p>
+            <a:pPr algn="ctr"/>
+            <a:r>
+              <a:rPr lang="tr-TR" dirty="0" smtClean="0"/>
+              <a:t>Probabilities</a:t>
+            </a:r>
+            <a:endParaRPr lang="en-US" dirty="0"/>
+          </a:p>
+        </p:txBody>
+      </p:sp>
+      <p:sp>
+        <p:nvSpPr>
+          <p:cNvPr id="7" name="TextBox 6"/>
+          <p:cNvSpPr txBox="1"/>
+          <p:nvPr/>
+        </p:nvSpPr>
+        <p:spPr>
+          <a:xfrm>
+            <a:off x="897491" y="5214950"/>
+            <a:ext cx="1349536" cy="646331"/>
+          </a:xfrm>
+          <a:prstGeom prst="rect">
+            <a:avLst/>
+          </a:prstGeom>
+          <a:noFill/>
+        </p:spPr>
+        <p:txBody>
+          <a:bodyPr wrap="none" rtlCol="0">
+            <a:spAutoFit/>
+          </a:bodyPr>
+          <a:lstStyle/>
+          <a:p>
+            <a:pPr algn="ctr"/>
+            <a:r>
+              <a:rPr lang="tr-TR" dirty="0" smtClean="0"/>
+              <a:t>Stay Active </a:t>
+            </a:r>
+          </a:p>
+          <a:p>
+            <a:pPr algn="ctr"/>
+            <a:r>
+              <a:rPr lang="tr-TR" dirty="0" smtClean="0"/>
+              <a:t>Probabilities</a:t>
+            </a:r>
+            <a:endParaRPr lang="en-US" dirty="0"/>
+          </a:p>
+        </p:txBody>
+      </p:sp>
+    </p:spTree>
+  </p:cSld>
+  <p:clrMapOvr>
+    <a:masterClrMapping/>
+  </p:clrMapOvr>
+  <p:timing>
+    <p:tnLst>
+      <p:par>
+        <p:cTn id="1" dur="indefinite" restart="never" nodeType="tmRoot"/>
+      </p:par>
+    </p:tnLst>
+  </p:timing>
+</p:sld>
+</file>
+
+<file path=ppt/slides/slide24.xml><?xml version="1.0" encoding="utf-8"?>
 <p:sld xmlns:a="http://schemas.openxmlformats.org/drawingml/2006/main" xmlns:r="http://schemas.openxmlformats.org/officeDocument/2006/relationships" xmlns:p="http://schemas.openxmlformats.org/presentationml/2006/main">
   <p:cSld>
     <p:spTree>
@@ -6038,115 +6687,14 @@
   <p:timing>
     <p:tnLst>
       <p:par>
-        <p:cTn xmlns:p14="http://schemas.microsoft.com/office/powerpoint/2010/main" id="1" dur="indefinite" restart="never" nodeType="tmRoot"/>
+        <p:cTn id="1" dur="indefinite" restart="never" nodeType="tmRoot"/>
       </p:par>
     </p:tnLst>
   </p:timing>
 </p:sld>
 </file>
 
-<file path=ppt/slides/slide23.xml><?xml version="1.0" encoding="utf-8"?>
-<p:sld xmlns:a="http://schemas.openxmlformats.org/drawingml/2006/main" xmlns:r="http://schemas.openxmlformats.org/officeDocument/2006/relationships" xmlns:p="http://schemas.openxmlformats.org/presentationml/2006/main">
-  <p:cSld>
-    <p:spTree>
-      <p:nvGrpSpPr>
-        <p:cNvPr id="1" name=""/>
-        <p:cNvGrpSpPr/>
-        <p:nvPr/>
-      </p:nvGrpSpPr>
-      <p:grpSpPr>
-        <a:xfrm>
-          <a:off x="0" y="0"/>
-          <a:ext cx="0" cy="0"/>
-          <a:chOff x="0" y="0"/>
-          <a:chExt cx="0" cy="0"/>
-        </a:xfrm>
-      </p:grpSpPr>
-      <p:sp>
-        <p:nvSpPr>
-          <p:cNvPr id="2" name="Title 1"/>
-          <p:cNvSpPr>
-            <a:spLocks noGrp="1"/>
-          </p:cNvSpPr>
-          <p:nvPr>
-            <p:ph type="title"/>
-          </p:nvPr>
-        </p:nvSpPr>
-        <p:spPr/>
-        <p:txBody>
-          <a:bodyPr/>
-          <a:lstStyle/>
-          <a:p>
-            <a:r>
-              <a:rPr lang="en-US" noProof="0" smtClean="0"/>
-              <a:t>Client Types</a:t>
-            </a:r>
-            <a:endParaRPr lang="en-US" noProof="0"/>
-          </a:p>
-        </p:txBody>
-      </p:sp>
-      <p:sp>
-        <p:nvSpPr>
-          <p:cNvPr id="3" name="Content Placeholder 2"/>
-          <p:cNvSpPr>
-            <a:spLocks noGrp="1"/>
-          </p:cNvSpPr>
-          <p:nvPr>
-            <p:ph idx="1"/>
-          </p:nvPr>
-        </p:nvSpPr>
-        <p:spPr/>
-        <p:txBody>
-          <a:bodyPr>
-            <a:normAutofit/>
-          </a:bodyPr>
-          <a:lstStyle/>
-          <a:p>
-            <a:r>
-              <a:rPr lang="en-US" noProof="0" dirty="0" smtClean="0"/>
-              <a:t>Three different user types are outlined with different networking and mobility requirements.</a:t>
-            </a:r>
-          </a:p>
-          <a:p>
-            <a:pPr lvl="1"/>
-            <a:r>
-              <a:rPr lang="en-US" noProof="0" dirty="0" smtClean="0"/>
-              <a:t>Students</a:t>
-            </a:r>
-          </a:p>
-          <a:p>
-            <a:pPr lvl="1"/>
-            <a:r>
-              <a:rPr lang="en-US" noProof="0" dirty="0" smtClean="0"/>
-              <a:t>Employees</a:t>
-            </a:r>
-          </a:p>
-          <a:p>
-            <a:pPr lvl="1"/>
-            <a:r>
-              <a:rPr lang="en-US" noProof="0" dirty="0" smtClean="0"/>
-              <a:t>Domestics</a:t>
-            </a:r>
-            <a:endParaRPr lang="en-US" noProof="0" dirty="0"/>
-          </a:p>
-        </p:txBody>
-      </p:sp>
-    </p:spTree>
-  </p:cSld>
-  <p:clrMapOvr>
-    <a:masterClrMapping/>
-  </p:clrMapOvr>
-  <p:timing>
-    <p:tnLst>
-      <p:par>
-        <p:cTn xmlns:p14="http://schemas.microsoft.com/office/powerpoint/2010/main" id="1" dur="indefinite" restart="never" nodeType="tmRoot"/>
-      </p:par>
-    </p:tnLst>
-  </p:timing>
-</p:sld>
-</file>
-
-<file path=ppt/slides/slide24.xml><?xml version="1.0" encoding="utf-8"?>
+<file path=ppt/slides/slide25.xml><?xml version="1.0" encoding="utf-8"?>
 <p:sld xmlns:a="http://schemas.openxmlformats.org/drawingml/2006/main" xmlns:r="http://schemas.openxmlformats.org/officeDocument/2006/relationships" xmlns:p="http://schemas.openxmlformats.org/presentationml/2006/main">
   <p:cSld>
     <p:spTree>
@@ -6254,7 +6802,7 @@
 </p:sld>
 </file>
 
-<file path=ppt/slides/slide25.xml><?xml version="1.0" encoding="utf-8"?>
+<file path=ppt/slides/slide26.xml><?xml version="1.0" encoding="utf-8"?>
 <p:sld xmlns:a="http://schemas.openxmlformats.org/drawingml/2006/main" xmlns:r="http://schemas.openxmlformats.org/officeDocument/2006/relationships" xmlns:p="http://schemas.openxmlformats.org/presentationml/2006/main">
   <p:cSld>
     <p:spTree>
@@ -6328,7 +6876,7 @@
           <p:nvPr/>
         </p:nvPicPr>
         <p:blipFill>
-          <a:blip r:embed="rId2"/>
+          <a:blip r:embed="rId2" cstate="print"/>
           <a:srcRect/>
           <a:stretch>
             <a:fillRect/>
@@ -6359,14 +6907,14 @@
   <p:timing>
     <p:tnLst>
       <p:par>
-        <p:cTn xmlns:p14="http://schemas.microsoft.com/office/powerpoint/2010/main" id="1" dur="indefinite" restart="never" nodeType="tmRoot"/>
+        <p:cTn id="1" dur="indefinite" restart="never" nodeType="tmRoot"/>
       </p:par>
     </p:tnLst>
   </p:timing>
 </p:sld>
 </file>
 
-<file path=ppt/slides/slide26.xml><?xml version="1.0" encoding="utf-8"?>
+<file path=ppt/slides/slide27.xml><?xml version="1.0" encoding="utf-8"?>
 <p:sld xmlns:a="http://schemas.openxmlformats.org/drawingml/2006/main" xmlns:r="http://schemas.openxmlformats.org/officeDocument/2006/relationships" xmlns:p="http://schemas.openxmlformats.org/presentationml/2006/main">
   <p:cSld>
     <p:spTree>
@@ -6443,7 +6991,7 @@
           <p:nvPr/>
         </p:nvPicPr>
         <p:blipFill>
-          <a:blip r:embed="rId2"/>
+          <a:blip r:embed="rId2" cstate="print"/>
           <a:srcRect/>
           <a:stretch>
             <a:fillRect/>
@@ -6474,14 +7022,14 @@
   <p:timing>
     <p:tnLst>
       <p:par>
-        <p:cTn xmlns:p14="http://schemas.microsoft.com/office/powerpoint/2010/main" id="1" dur="indefinite" restart="never" nodeType="tmRoot"/>
+        <p:cTn id="1" dur="indefinite" restart="never" nodeType="tmRoot"/>
       </p:par>
     </p:tnLst>
   </p:timing>
 </p:sld>
 </file>
 
-<file path=ppt/slides/slide27.xml><?xml version="1.0" encoding="utf-8"?>
+<file path=ppt/slides/slide28.xml><?xml version="1.0" encoding="utf-8"?>
 <p:sld xmlns:a="http://schemas.openxmlformats.org/drawingml/2006/main" xmlns:r="http://schemas.openxmlformats.org/officeDocument/2006/relationships" xmlns:p="http://schemas.openxmlformats.org/presentationml/2006/main">
   <p:cSld>
     <p:spTree>
@@ -6556,7 +7104,7 @@
           <p:nvPr/>
         </p:nvPicPr>
         <p:blipFill>
-          <a:blip r:embed="rId2"/>
+          <a:blip r:embed="rId2" cstate="print"/>
           <a:srcRect/>
           <a:stretch>
             <a:fillRect/>
@@ -6587,14 +7135,14 @@
   <p:timing>
     <p:tnLst>
       <p:par>
-        <p:cTn xmlns:p14="http://schemas.microsoft.com/office/powerpoint/2010/main" id="1" dur="indefinite" restart="never" nodeType="tmRoot"/>
+        <p:cTn id="1" dur="indefinite" restart="never" nodeType="tmRoot"/>
       </p:par>
     </p:tnLst>
   </p:timing>
 </p:sld>
 </file>
 
-<file path=ppt/slides/slide28.xml><?xml version="1.0" encoding="utf-8"?>
+<file path=ppt/slides/slide29.xml><?xml version="1.0" encoding="utf-8"?>
 <p:sld xmlns:a="http://schemas.openxmlformats.org/drawingml/2006/main" xmlns:r="http://schemas.openxmlformats.org/officeDocument/2006/relationships" xmlns:p="http://schemas.openxmlformats.org/presentationml/2006/main">
   <p:cSld>
     <p:spTree>
@@ -6673,7 +7221,7 @@
           <p:nvPr/>
         </p:nvPicPr>
         <p:blipFill>
-          <a:blip r:embed="rId2"/>
+          <a:blip r:embed="rId2" cstate="print"/>
           <a:srcRect/>
           <a:stretch>
             <a:fillRect/>
@@ -6704,14 +7252,14 @@
   <p:timing>
     <p:tnLst>
       <p:par>
-        <p:cTn xmlns:p14="http://schemas.microsoft.com/office/powerpoint/2010/main" id="1" dur="indefinite" restart="never" nodeType="tmRoot"/>
+        <p:cTn id="1" dur="indefinite" restart="never" nodeType="tmRoot"/>
       </p:par>
     </p:tnLst>
   </p:timing>
 </p:sld>
 </file>
 
-<file path=ppt/slides/slide29.xml><?xml version="1.0" encoding="utf-8"?>
+<file path=ppt/slides/slide3.xml><?xml version="1.0" encoding="utf-8"?>
 <p:sld xmlns:a="http://schemas.openxmlformats.org/drawingml/2006/main" xmlns:r="http://schemas.openxmlformats.org/officeDocument/2006/relationships" xmlns:p="http://schemas.openxmlformats.org/presentationml/2006/main">
   <p:cSld>
     <p:spTree>
@@ -6744,6 +7292,147 @@
           <a:lstStyle/>
           <a:p>
             <a:r>
+              <a:rPr lang="en-US" noProof="0" dirty="0" smtClean="0">
+                <a:cs typeface="Arial"/>
+              </a:rPr>
+              <a:t>Thesis in a Nutshell</a:t>
+            </a:r>
+            <a:endParaRPr lang="en-US" noProof="0" dirty="0">
+              <a:cs typeface="Arial"/>
+            </a:endParaRPr>
+          </a:p>
+        </p:txBody>
+      </p:sp>
+      <p:sp>
+        <p:nvSpPr>
+          <p:cNvPr id="3" name="Content Placeholder 2"/>
+          <p:cNvSpPr>
+            <a:spLocks noGrp="1"/>
+          </p:cNvSpPr>
+          <p:nvPr>
+            <p:ph idx="1"/>
+          </p:nvPr>
+        </p:nvSpPr>
+        <p:spPr/>
+        <p:txBody>
+          <a:bodyPr>
+            <a:normAutofit lnSpcReduction="10000"/>
+          </a:bodyPr>
+          <a:lstStyle/>
+          <a:p>
+            <a:r>
+              <a:rPr lang="en-US" noProof="0" dirty="0" smtClean="0">
+                <a:cs typeface="Arial"/>
+              </a:rPr>
+              <a:t>A secure prepaid payment scheme for broadband Internet access is designed and developed in a simulation environment.</a:t>
+            </a:r>
+          </a:p>
+          <a:p>
+            <a:r>
+              <a:rPr lang="en-US" noProof="0" dirty="0" smtClean="0">
+                <a:cs typeface="Arial"/>
+              </a:rPr>
+              <a:t>This scheme will be particularly for Wireless Mesh Networks with multiple operators.</a:t>
+            </a:r>
+          </a:p>
+          <a:p>
+            <a:r>
+              <a:rPr lang="en-US" dirty="0" smtClean="0">
+                <a:cs typeface="Arial"/>
+              </a:rPr>
+              <a:t>Proposed scheme provides privacy and untraceability.</a:t>
+            </a:r>
+          </a:p>
+          <a:p>
+            <a:r>
+              <a:rPr lang="en-US" noProof="0" dirty="0" smtClean="0">
+                <a:cs typeface="Arial"/>
+              </a:rPr>
+              <a:t>System performance is evaluated using network simulations.</a:t>
+            </a:r>
+            <a:endParaRPr lang="en-US" noProof="0" dirty="0">
+              <a:cs typeface="Arial"/>
+            </a:endParaRPr>
+          </a:p>
+        </p:txBody>
+      </p:sp>
+      <p:sp>
+        <p:nvSpPr>
+          <p:cNvPr id="4" name="Slide Number Placeholder 3"/>
+          <p:cNvSpPr>
+            <a:spLocks noGrp="1"/>
+          </p:cNvSpPr>
+          <p:nvPr>
+            <p:ph type="sldNum" sz="quarter" idx="12"/>
+          </p:nvPr>
+        </p:nvSpPr>
+        <p:spPr/>
+        <p:txBody>
+          <a:bodyPr/>
+          <a:lstStyle/>
+          <a:p>
+            <a:fld id="{7F5CE407-6216-4202-80E4-A30DC2F709B2}" type="slidenum">
+              <a:rPr lang="en-US" smtClean="0"/>
+              <a:pPr/>
+              <a:t>3</a:t>
+            </a:fld>
+            <a:endParaRPr lang="en-US" dirty="0"/>
+          </a:p>
+        </p:txBody>
+      </p:sp>
+    </p:spTree>
+    <p:extLst>
+      <p:ext uri="{BB962C8B-B14F-4D97-AF65-F5344CB8AC3E}">
+        <p14:creationId xmlns:p14="http://schemas.microsoft.com/office/powerpoint/2010/main" xmlns="" val="2774399580"/>
+      </p:ext>
+    </p:extLst>
+  </p:cSld>
+  <p:clrMapOvr>
+    <a:masterClrMapping/>
+  </p:clrMapOvr>
+  <p:timing>
+    <p:tnLst>
+      <p:par>
+        <p:cTn id="1" dur="indefinite" restart="never" nodeType="tmRoot"/>
+      </p:par>
+    </p:tnLst>
+  </p:timing>
+</p:sld>
+</file>
+
+<file path=ppt/slides/slide30.xml><?xml version="1.0" encoding="utf-8"?>
+<p:sld xmlns:a="http://schemas.openxmlformats.org/drawingml/2006/main" xmlns:r="http://schemas.openxmlformats.org/officeDocument/2006/relationships" xmlns:p="http://schemas.openxmlformats.org/presentationml/2006/main">
+  <p:cSld>
+    <p:spTree>
+      <p:nvGrpSpPr>
+        <p:cNvPr id="1" name=""/>
+        <p:cNvGrpSpPr/>
+        <p:nvPr/>
+      </p:nvGrpSpPr>
+      <p:grpSpPr>
+        <a:xfrm>
+          <a:off x="0" y="0"/>
+          <a:ext cx="0" cy="0"/>
+          <a:chOff x="0" y="0"/>
+          <a:chExt cx="0" cy="0"/>
+        </a:xfrm>
+      </p:grpSpPr>
+      <p:sp>
+        <p:nvSpPr>
+          <p:cNvPr id="2" name="Title 1"/>
+          <p:cNvSpPr>
+            <a:spLocks noGrp="1"/>
+          </p:cNvSpPr>
+          <p:nvPr>
+            <p:ph type="title"/>
+          </p:nvPr>
+        </p:nvSpPr>
+        <p:spPr/>
+        <p:txBody>
+          <a:bodyPr/>
+          <a:lstStyle/>
+          <a:p>
+            <a:r>
               <a:rPr lang="en-US" noProof="0" smtClean="0"/>
               <a:t>Simulation Results of Protocols</a:t>
             </a:r>
@@ -6788,7 +7477,7 @@
           <p:nvPr/>
         </p:nvPicPr>
         <p:blipFill>
-          <a:blip r:embed="rId2"/>
+          <a:blip r:embed="rId2" cstate="print"/>
           <a:srcRect/>
           <a:stretch>
             <a:fillRect/>
@@ -6819,14 +7508,14 @@
   <p:timing>
     <p:tnLst>
       <p:par>
-        <p:cTn xmlns:p14="http://schemas.microsoft.com/office/powerpoint/2010/main" id="1" dur="indefinite" restart="never" nodeType="tmRoot"/>
+        <p:cTn id="1" dur="indefinite" restart="never" nodeType="tmRoot"/>
       </p:par>
     </p:tnLst>
   </p:timing>
 </p:sld>
 </file>
 
-<file path=ppt/slides/slide3.xml><?xml version="1.0" encoding="utf-8"?>
+<file path=ppt/slides/slide31.xml><?xml version="1.0" encoding="utf-8"?>
 <p:sld xmlns:a="http://schemas.openxmlformats.org/drawingml/2006/main" xmlns:r="http://schemas.openxmlformats.org/officeDocument/2006/relationships" xmlns:p="http://schemas.openxmlformats.org/presentationml/2006/main">
   <p:cSld>
     <p:spTree>
@@ -6859,147 +7548,6 @@
           <a:lstStyle/>
           <a:p>
             <a:r>
-              <a:rPr lang="en-US" noProof="0" dirty="0" smtClean="0">
-                <a:cs typeface="Arial"/>
-              </a:rPr>
-              <a:t>Thesis in a Nutshell</a:t>
-            </a:r>
-            <a:endParaRPr lang="en-US" noProof="0" dirty="0">
-              <a:cs typeface="Arial"/>
-            </a:endParaRPr>
-          </a:p>
-        </p:txBody>
-      </p:sp>
-      <p:sp>
-        <p:nvSpPr>
-          <p:cNvPr id="3" name="Content Placeholder 2"/>
-          <p:cNvSpPr>
-            <a:spLocks noGrp="1"/>
-          </p:cNvSpPr>
-          <p:nvPr>
-            <p:ph idx="1"/>
-          </p:nvPr>
-        </p:nvSpPr>
-        <p:spPr/>
-        <p:txBody>
-          <a:bodyPr>
-            <a:normAutofit lnSpcReduction="10000"/>
-          </a:bodyPr>
-          <a:lstStyle/>
-          <a:p>
-            <a:r>
-              <a:rPr lang="en-US" noProof="0" dirty="0" smtClean="0">
-                <a:cs typeface="Arial"/>
-              </a:rPr>
-              <a:t>A secure prepaid payment scheme for broadband Internet access is designed and developed in a simulation environment.</a:t>
-            </a:r>
-          </a:p>
-          <a:p>
-            <a:r>
-              <a:rPr lang="en-US" noProof="0" dirty="0" smtClean="0">
-                <a:cs typeface="Arial"/>
-              </a:rPr>
-              <a:t>This scheme will be particularly for Wireless Mesh Networks with multiple operators.</a:t>
-            </a:r>
-          </a:p>
-          <a:p>
-            <a:r>
-              <a:rPr lang="en-US" dirty="0" smtClean="0">
-                <a:cs typeface="Arial"/>
-              </a:rPr>
-              <a:t>Proposed scheme provides privacy and untraceability.</a:t>
-            </a:r>
-          </a:p>
-          <a:p>
-            <a:r>
-              <a:rPr lang="en-US" noProof="0" dirty="0" smtClean="0">
-                <a:cs typeface="Arial"/>
-              </a:rPr>
-              <a:t>System performance is evaluated using network simulations.</a:t>
-            </a:r>
-            <a:endParaRPr lang="en-US" noProof="0" dirty="0">
-              <a:cs typeface="Arial"/>
-            </a:endParaRPr>
-          </a:p>
-        </p:txBody>
-      </p:sp>
-      <p:sp>
-        <p:nvSpPr>
-          <p:cNvPr id="4" name="Slide Number Placeholder 3"/>
-          <p:cNvSpPr>
-            <a:spLocks noGrp="1"/>
-          </p:cNvSpPr>
-          <p:nvPr>
-            <p:ph type="sldNum" sz="quarter" idx="12"/>
-          </p:nvPr>
-        </p:nvSpPr>
-        <p:spPr/>
-        <p:txBody>
-          <a:bodyPr/>
-          <a:lstStyle/>
-          <a:p>
-            <a:fld id="{7F5CE407-6216-4202-80E4-A30DC2F709B2}" type="slidenum">
-              <a:rPr lang="en-US" smtClean="0"/>
-              <a:pPr/>
-              <a:t>3</a:t>
-            </a:fld>
-            <a:endParaRPr lang="en-US" dirty="0"/>
-          </a:p>
-        </p:txBody>
-      </p:sp>
-    </p:spTree>
-    <p:extLst>
-      <p:ext uri="{BB962C8B-B14F-4D97-AF65-F5344CB8AC3E}">
-        <p14:creationId xmlns:p14="http://schemas.microsoft.com/office/powerpoint/2010/main" val="2774399580"/>
-      </p:ext>
-    </p:extLst>
-  </p:cSld>
-  <p:clrMapOvr>
-    <a:masterClrMapping/>
-  </p:clrMapOvr>
-  <p:timing>
-    <p:tnLst>
-      <p:par>
-        <p:cTn xmlns:p14="http://schemas.microsoft.com/office/powerpoint/2010/main" id="1" dur="indefinite" restart="never" nodeType="tmRoot"/>
-      </p:par>
-    </p:tnLst>
-  </p:timing>
-</p:sld>
-</file>
-
-<file path=ppt/slides/slide30.xml><?xml version="1.0" encoding="utf-8"?>
-<p:sld xmlns:a="http://schemas.openxmlformats.org/drawingml/2006/main" xmlns:r="http://schemas.openxmlformats.org/officeDocument/2006/relationships" xmlns:p="http://schemas.openxmlformats.org/presentationml/2006/main">
-  <p:cSld>
-    <p:spTree>
-      <p:nvGrpSpPr>
-        <p:cNvPr id="1" name=""/>
-        <p:cNvGrpSpPr/>
-        <p:nvPr/>
-      </p:nvGrpSpPr>
-      <p:grpSpPr>
-        <a:xfrm>
-          <a:off x="0" y="0"/>
-          <a:ext cx="0" cy="0"/>
-          <a:chOff x="0" y="0"/>
-          <a:chExt cx="0" cy="0"/>
-        </a:xfrm>
-      </p:grpSpPr>
-      <p:sp>
-        <p:nvSpPr>
-          <p:cNvPr id="2" name="Title 1"/>
-          <p:cNvSpPr>
-            <a:spLocks noGrp="1"/>
-          </p:cNvSpPr>
-          <p:nvPr>
-            <p:ph type="title"/>
-          </p:nvPr>
-        </p:nvSpPr>
-        <p:spPr/>
-        <p:txBody>
-          <a:bodyPr/>
-          <a:lstStyle/>
-          <a:p>
-            <a:r>
               <a:rPr lang="en-US" noProof="0" smtClean="0"/>
               <a:t>Simulation Results of Protocols</a:t>
             </a:r>
@@ -7044,7 +7592,7 @@
           <p:nvPr/>
         </p:nvPicPr>
         <p:blipFill>
-          <a:blip r:embed="rId2"/>
+          <a:blip r:embed="rId2" cstate="print"/>
           <a:srcRect/>
           <a:stretch>
             <a:fillRect/>
@@ -7075,14 +7623,14 @@
   <p:timing>
     <p:tnLst>
       <p:par>
-        <p:cTn xmlns:p14="http://schemas.microsoft.com/office/powerpoint/2010/main" id="1" dur="indefinite" restart="never" nodeType="tmRoot"/>
+        <p:cTn id="1" dur="indefinite" restart="never" nodeType="tmRoot"/>
       </p:par>
     </p:tnLst>
   </p:timing>
 </p:sld>
 </file>
 
-<file path=ppt/slides/slide31.xml><?xml version="1.0" encoding="utf-8"?>
+<file path=ppt/slides/slide32.xml><?xml version="1.0" encoding="utf-8"?>
 <p:sld xmlns:a="http://schemas.openxmlformats.org/drawingml/2006/main" xmlns:r="http://schemas.openxmlformats.org/officeDocument/2006/relationships" xmlns:p="http://schemas.openxmlformats.org/presentationml/2006/main">
   <p:cSld>
     <p:spTree>
@@ -7192,14 +7740,14 @@
   <p:timing>
     <p:tnLst>
       <p:par>
-        <p:cTn xmlns:p14="http://schemas.microsoft.com/office/powerpoint/2010/main" id="1" dur="indefinite" restart="never" nodeType="tmRoot"/>
+        <p:cTn id="1" dur="indefinite" restart="never" nodeType="tmRoot"/>
       </p:par>
     </p:tnLst>
   </p:timing>
 </p:sld>
 </file>
 
-<file path=ppt/slides/slide32.xml><?xml version="1.0" encoding="utf-8"?>
+<file path=ppt/slides/slide33.xml><?xml version="1.0" encoding="utf-8"?>
 <p:sld xmlns:a="http://schemas.openxmlformats.org/drawingml/2006/main" xmlns:r="http://schemas.openxmlformats.org/officeDocument/2006/relationships" xmlns:p="http://schemas.openxmlformats.org/presentationml/2006/main">
   <p:cSld>
     <p:spTree>
@@ -7246,10 +7794,10 @@
           <p:nvPr/>
         </p:nvPicPr>
         <p:blipFill>
-          <a:blip r:embed="rId2">
+          <a:blip r:embed="rId2" cstate="print">
             <a:extLst>
               <a:ext uri="{28A0092B-C50C-407E-A947-70E740481C1C}">
-                <a14:useLocalDpi xmlns:a14="http://schemas.microsoft.com/office/drawing/2010/main" val="0"/>
+                <a14:useLocalDpi xmlns:a14="http://schemas.microsoft.com/office/drawing/2010/main" xmlns="" val="0"/>
               </a:ext>
             </a:extLst>
           </a:blip>
@@ -7279,10 +7827,10 @@
           <p:nvPr/>
         </p:nvPicPr>
         <p:blipFill>
-          <a:blip r:embed="rId3">
+          <a:blip r:embed="rId3" cstate="print">
             <a:extLst>
               <a:ext uri="{28A0092B-C50C-407E-A947-70E740481C1C}">
-                <a14:useLocalDpi xmlns:a14="http://schemas.microsoft.com/office/drawing/2010/main" val="0"/>
+                <a14:useLocalDpi xmlns:a14="http://schemas.microsoft.com/office/drawing/2010/main" xmlns="" val="0"/>
               </a:ext>
             </a:extLst>
           </a:blip>
@@ -7313,127 +7861,7 @@
   <p:timing>
     <p:tnLst>
       <p:par>
-        <p:cTn xmlns:p14="http://schemas.microsoft.com/office/powerpoint/2010/main" id="1" dur="indefinite" restart="never" nodeType="tmRoot"/>
-      </p:par>
-    </p:tnLst>
-  </p:timing>
-</p:sld>
-</file>
-
-<file path=ppt/slides/slide33.xml><?xml version="1.0" encoding="utf-8"?>
-<p:sld xmlns:a="http://schemas.openxmlformats.org/drawingml/2006/main" xmlns:r="http://schemas.openxmlformats.org/officeDocument/2006/relationships" xmlns:p="http://schemas.openxmlformats.org/presentationml/2006/main">
-  <p:cSld>
-    <p:spTree>
-      <p:nvGrpSpPr>
-        <p:cNvPr id="1" name=""/>
-        <p:cNvGrpSpPr/>
-        <p:nvPr/>
-      </p:nvGrpSpPr>
-      <p:grpSpPr>
-        <a:xfrm>
-          <a:off x="0" y="0"/>
-          <a:ext cx="0" cy="0"/>
-          <a:chOff x="0" y="0"/>
-          <a:chExt cx="0" cy="0"/>
-        </a:xfrm>
-      </p:grpSpPr>
-      <p:sp>
-        <p:nvSpPr>
-          <p:cNvPr id="2" name="Title 1"/>
-          <p:cNvSpPr>
-            <a:spLocks noGrp="1"/>
-          </p:cNvSpPr>
-          <p:nvPr>
-            <p:ph type="title"/>
-          </p:nvPr>
-        </p:nvSpPr>
-        <p:spPr/>
-        <p:txBody>
-          <a:bodyPr/>
-          <a:lstStyle/>
-          <a:p>
-            <a:r>
-              <a:rPr lang="en-US" noProof="0" smtClean="0"/>
-              <a:t>Discussion</a:t>
-            </a:r>
-            <a:endParaRPr lang="en-US" noProof="0"/>
-          </a:p>
-        </p:txBody>
-      </p:sp>
-      <p:sp>
-        <p:nvSpPr>
-          <p:cNvPr id="3" name="Content Placeholder 2"/>
-          <p:cNvSpPr>
-            <a:spLocks noGrp="1"/>
-          </p:cNvSpPr>
-          <p:nvPr>
-            <p:ph idx="1"/>
-          </p:nvPr>
-        </p:nvSpPr>
-        <p:spPr>
-          <a:xfrm>
-            <a:off x="457200" y="1600200"/>
-            <a:ext cx="8229600" cy="4972072"/>
-          </a:xfrm>
-        </p:spPr>
-        <p:txBody>
-          <a:bodyPr>
-            <a:normAutofit/>
-          </a:bodyPr>
-          <a:lstStyle/>
-          <a:p>
-            <a:r>
-              <a:rPr lang="en-US" noProof="0" smtClean="0"/>
-              <a:t>Wide Coverage</a:t>
-            </a:r>
-          </a:p>
-          <a:p>
-            <a:r>
-              <a:rPr lang="en-US" noProof="0" smtClean="0"/>
-              <a:t>Seamless Mobility and Roaming</a:t>
-            </a:r>
-          </a:p>
-          <a:p>
-            <a:r>
-              <a:rPr lang="en-US" noProof="0" smtClean="0"/>
-              <a:t>Anonymity</a:t>
-            </a:r>
-          </a:p>
-          <a:p>
-            <a:r>
-              <a:rPr lang="en-US" noProof="0" smtClean="0"/>
-              <a:t>Mutual authentication</a:t>
-            </a:r>
-          </a:p>
-          <a:p>
-            <a:r>
-              <a:rPr lang="en-US" noProof="0" smtClean="0"/>
-              <a:t>Two-way honesty</a:t>
-            </a:r>
-          </a:p>
-          <a:p>
-            <a:r>
-              <a:rPr lang="en-US" noProof="0" smtClean="0"/>
-              <a:t>Untraceability</a:t>
-            </a:r>
-          </a:p>
-          <a:p>
-            <a:r>
-              <a:rPr lang="en-US" noProof="0" smtClean="0"/>
-              <a:t>Performance</a:t>
-            </a:r>
-          </a:p>
-        </p:txBody>
-      </p:sp>
-    </p:spTree>
-  </p:cSld>
-  <p:clrMapOvr>
-    <a:masterClrMapping/>
-  </p:clrMapOvr>
-  <p:timing>
-    <p:tnLst>
-      <p:par>
-        <p:cTn xmlns:p14="http://schemas.microsoft.com/office/powerpoint/2010/main" id="1" dur="indefinite" restart="never" nodeType="tmRoot"/>
+        <p:cTn id="1" dur="indefinite" restart="never" nodeType="tmRoot"/>
       </p:par>
     </p:tnLst>
   </p:timing>
@@ -7474,7 +7902,7 @@
           <a:p>
             <a:r>
               <a:rPr lang="en-US" noProof="0" smtClean="0"/>
-              <a:t>Conclusion</a:t>
+              <a:t>Discussion</a:t>
             </a:r>
             <a:endParaRPr lang="en-US" noProof="0"/>
           </a:p>
@@ -7490,39 +7918,58 @@
             <p:ph idx="1"/>
           </p:nvPr>
         </p:nvSpPr>
-        <p:spPr/>
+        <p:spPr>
+          <a:xfrm>
+            <a:off x="457200" y="1600200"/>
+            <a:ext cx="8229600" cy="4972072"/>
+          </a:xfrm>
+        </p:spPr>
         <p:txBody>
           <a:bodyPr>
-            <a:normAutofit lnSpcReduction="10000"/>
+            <a:normAutofit/>
           </a:bodyPr>
           <a:lstStyle/>
           <a:p>
             <a:r>
-              <a:rPr lang="en-US" noProof="0" dirty="0" smtClean="0"/>
-              <a:t>SSPayWMN is a secure and seamless prepayment scheme, which provides privacy and untraceability for the clients.</a:t>
-            </a:r>
-          </a:p>
-          <a:p>
-            <a:r>
-              <a:rPr lang="en-US" noProof="0" dirty="0" smtClean="0"/>
-              <a:t>This system provides fairness to both operators and to clients.</a:t>
-            </a:r>
-          </a:p>
-          <a:p>
-            <a:r>
-              <a:rPr lang="en-US" noProof="0" dirty="0" smtClean="0"/>
-              <a:t>Seamless mobility and roaming</a:t>
-            </a:r>
-          </a:p>
-          <a:p>
-            <a:r>
-              <a:rPr lang="en-US" dirty="0" smtClean="0"/>
-              <a:t>Unit test simulations and real-life scenario simulation results ensures the system’s stability and steady state performance.</a:t>
-            </a:r>
-            <a:endParaRPr lang="en-US" noProof="0" dirty="0" smtClean="0"/>
-          </a:p>
-          <a:p>
-            <a:endParaRPr lang="en-US" noProof="0" dirty="0"/>
+              <a:rPr lang="en-US" noProof="0" smtClean="0"/>
+              <a:t>Wide Coverage</a:t>
+            </a:r>
+          </a:p>
+          <a:p>
+            <a:r>
+              <a:rPr lang="en-US" noProof="0" smtClean="0"/>
+              <a:t>Seamless Mobility and Roaming</a:t>
+            </a:r>
+          </a:p>
+          <a:p>
+            <a:r>
+              <a:rPr lang="en-US" noProof="0" smtClean="0"/>
+              <a:t>Anonymity</a:t>
+            </a:r>
+          </a:p>
+          <a:p>
+            <a:r>
+              <a:rPr lang="en-US" noProof="0" smtClean="0"/>
+              <a:t>Mutual authentication</a:t>
+            </a:r>
+          </a:p>
+          <a:p>
+            <a:r>
+              <a:rPr lang="en-US" noProof="0" smtClean="0"/>
+              <a:t>Two-way honesty</a:t>
+            </a:r>
+          </a:p>
+          <a:p>
+            <a:r>
+              <a:rPr lang="en-US" noProof="0" smtClean="0"/>
+              <a:t>Untraceability</a:t>
+            </a:r>
+          </a:p>
+          <a:p>
+            <a:r>
+              <a:rPr lang="en-US" noProof="0" smtClean="0"/>
+              <a:t>Performance</a:t>
+            </a:r>
           </a:p>
         </p:txBody>
       </p:sp>
@@ -7534,7 +7981,7 @@
   <p:timing>
     <p:tnLst>
       <p:par>
-        <p:cTn xmlns:p14="http://schemas.microsoft.com/office/powerpoint/2010/main" id="1" dur="indefinite" restart="never" nodeType="tmRoot"/>
+        <p:cTn id="1" dur="indefinite" restart="never" nodeType="tmRoot"/>
       </p:par>
     </p:tnLst>
   </p:timing>
@@ -7574,6 +8021,107 @@
           <a:lstStyle/>
           <a:p>
             <a:r>
+              <a:rPr lang="en-US" noProof="0" smtClean="0"/>
+              <a:t>Conclusion</a:t>
+            </a:r>
+            <a:endParaRPr lang="en-US" noProof="0"/>
+          </a:p>
+        </p:txBody>
+      </p:sp>
+      <p:sp>
+        <p:nvSpPr>
+          <p:cNvPr id="3" name="Content Placeholder 2"/>
+          <p:cNvSpPr>
+            <a:spLocks noGrp="1"/>
+          </p:cNvSpPr>
+          <p:nvPr>
+            <p:ph idx="1"/>
+          </p:nvPr>
+        </p:nvSpPr>
+        <p:spPr/>
+        <p:txBody>
+          <a:bodyPr>
+            <a:normAutofit lnSpcReduction="10000"/>
+          </a:bodyPr>
+          <a:lstStyle/>
+          <a:p>
+            <a:r>
+              <a:rPr lang="en-US" noProof="0" dirty="0" smtClean="0"/>
+              <a:t>SSPayWMN is a secure and seamless prepayment scheme, which provides privacy and untraceability for the clients.</a:t>
+            </a:r>
+          </a:p>
+          <a:p>
+            <a:r>
+              <a:rPr lang="en-US" noProof="0" dirty="0" smtClean="0"/>
+              <a:t>This system provides fairness to both operators and to clients.</a:t>
+            </a:r>
+          </a:p>
+          <a:p>
+            <a:r>
+              <a:rPr lang="en-US" noProof="0" dirty="0" smtClean="0"/>
+              <a:t>Seamless mobility and roaming</a:t>
+            </a:r>
+          </a:p>
+          <a:p>
+            <a:r>
+              <a:rPr lang="en-US" dirty="0" smtClean="0"/>
+              <a:t>Unit test simulations and real-life scenario simulation results ensures the system’s stability and steady state performance.</a:t>
+            </a:r>
+            <a:endParaRPr lang="en-US" noProof="0" dirty="0" smtClean="0"/>
+          </a:p>
+          <a:p>
+            <a:endParaRPr lang="en-US" noProof="0" dirty="0"/>
+          </a:p>
+        </p:txBody>
+      </p:sp>
+    </p:spTree>
+  </p:cSld>
+  <p:clrMapOvr>
+    <a:masterClrMapping/>
+  </p:clrMapOvr>
+  <p:timing>
+    <p:tnLst>
+      <p:par>
+        <p:cTn id="1" dur="indefinite" restart="never" nodeType="tmRoot"/>
+      </p:par>
+    </p:tnLst>
+  </p:timing>
+</p:sld>
+</file>
+
+<file path=ppt/slides/slide36.xml><?xml version="1.0" encoding="utf-8"?>
+<p:sld xmlns:a="http://schemas.openxmlformats.org/drawingml/2006/main" xmlns:r="http://schemas.openxmlformats.org/officeDocument/2006/relationships" xmlns:p="http://schemas.openxmlformats.org/presentationml/2006/main">
+  <p:cSld>
+    <p:spTree>
+      <p:nvGrpSpPr>
+        <p:cNvPr id="1" name=""/>
+        <p:cNvGrpSpPr/>
+        <p:nvPr/>
+      </p:nvGrpSpPr>
+      <p:grpSpPr>
+        <a:xfrm>
+          <a:off x="0" y="0"/>
+          <a:ext cx="0" cy="0"/>
+          <a:chOff x="0" y="0"/>
+          <a:chExt cx="0" cy="0"/>
+        </a:xfrm>
+      </p:grpSpPr>
+      <p:sp>
+        <p:nvSpPr>
+          <p:cNvPr id="2" name="Title 1"/>
+          <p:cNvSpPr>
+            <a:spLocks noGrp="1"/>
+          </p:cNvSpPr>
+          <p:nvPr>
+            <p:ph type="title"/>
+          </p:nvPr>
+        </p:nvSpPr>
+        <p:spPr/>
+        <p:txBody>
+          <a:bodyPr/>
+          <a:lstStyle/>
+          <a:p>
+            <a:r>
               <a:rPr lang="en-US" dirty="0" smtClean="0"/>
               <a:t>Thank you</a:t>
             </a:r>
@@ -7607,7 +8155,7 @@
     </p:spTree>
     <p:extLst>
       <p:ext uri="{BB962C8B-B14F-4D97-AF65-F5344CB8AC3E}">
-        <p14:creationId xmlns:p14="http://schemas.microsoft.com/office/powerpoint/2010/main" val="685122559"/>
+        <p14:creationId xmlns:p14="http://schemas.microsoft.com/office/powerpoint/2010/main" xmlns="" val="685122559"/>
       </p:ext>
     </p:extLst>
   </p:cSld>
@@ -7617,7 +8165,7 @@
   <p:timing>
     <p:tnLst>
       <p:par>
-        <p:cTn xmlns:p14="http://schemas.microsoft.com/office/powerpoint/2010/main" id="1" dur="indefinite" restart="never" nodeType="tmRoot"/>
+        <p:cTn id="1" dur="indefinite" restart="never" nodeType="tmRoot"/>
       </p:par>
     </p:tnLst>
   </p:timing>
@@ -7785,7 +8333,7 @@
     </p:spTree>
     <p:extLst>
       <p:ext uri="{BB962C8B-B14F-4D97-AF65-F5344CB8AC3E}">
-        <p14:creationId xmlns:p14="http://schemas.microsoft.com/office/powerpoint/2010/main" val="4140221233"/>
+        <p14:creationId xmlns:p14="http://schemas.microsoft.com/office/powerpoint/2010/main" xmlns="" val="4140221233"/>
       </p:ext>
     </p:extLst>
   </p:cSld>
@@ -7795,7 +8343,7 @@
   <p:timing>
     <p:tnLst>
       <p:par>
-        <p:cTn xmlns:p14="http://schemas.microsoft.com/office/powerpoint/2010/main" id="1" dur="indefinite" restart="never" nodeType="tmRoot"/>
+        <p:cTn id="1" dur="indefinite" restart="never" nodeType="tmRoot"/>
       </p:par>
     </p:tnLst>
   </p:timing>
@@ -7831,6 +8379,75 @@
         </p:nvSpPr>
         <p:spPr/>
         <p:txBody>
+          <a:bodyPr>
+            <a:normAutofit fontScale="90000"/>
+          </a:bodyPr>
+          <a:lstStyle/>
+          <a:p>
+            <a:r>
+              <a:rPr lang="tr-TR" dirty="0" smtClean="0"/>
+              <a:t>Differences and Similarities with an Earlier Work</a:t>
+            </a:r>
+            <a:endParaRPr lang="en-US" dirty="0"/>
+          </a:p>
+        </p:txBody>
+      </p:sp>
+      <p:sp>
+        <p:nvSpPr>
+          <p:cNvPr id="3" name="Content Placeholder 2"/>
+          <p:cNvSpPr>
+            <a:spLocks noGrp="1"/>
+          </p:cNvSpPr>
+          <p:nvPr>
+            <p:ph idx="1"/>
+          </p:nvPr>
+        </p:nvSpPr>
+        <p:spPr/>
+        <p:txBody>
+          <a:bodyPr/>
+          <a:lstStyle/>
+          <a:p>
+            <a:endParaRPr lang="en-US"/>
+          </a:p>
+        </p:txBody>
+      </p:sp>
+    </p:spTree>
+  </p:cSld>
+  <p:clrMapOvr>
+    <a:masterClrMapping/>
+  </p:clrMapOvr>
+</p:sld>
+</file>
+
+<file path=ppt/slides/slide6.xml><?xml version="1.0" encoding="utf-8"?>
+<p:sld xmlns:a="http://schemas.openxmlformats.org/drawingml/2006/main" xmlns:r="http://schemas.openxmlformats.org/officeDocument/2006/relationships" xmlns:p="http://schemas.openxmlformats.org/presentationml/2006/main">
+  <p:cSld>
+    <p:spTree>
+      <p:nvGrpSpPr>
+        <p:cNvPr id="1" name=""/>
+        <p:cNvGrpSpPr/>
+        <p:nvPr/>
+      </p:nvGrpSpPr>
+      <p:grpSpPr>
+        <a:xfrm>
+          <a:off x="0" y="0"/>
+          <a:ext cx="0" cy="0"/>
+          <a:chOff x="0" y="0"/>
+          <a:chExt cx="0" cy="0"/>
+        </a:xfrm>
+      </p:grpSpPr>
+      <p:sp>
+        <p:nvSpPr>
+          <p:cNvPr id="2" name="Title 1"/>
+          <p:cNvSpPr>
+            <a:spLocks noGrp="1"/>
+          </p:cNvSpPr>
+          <p:nvPr>
+            <p:ph type="title"/>
+          </p:nvPr>
+        </p:nvSpPr>
+        <p:spPr/>
+        <p:txBody>
           <a:bodyPr/>
           <a:lstStyle/>
           <a:p>
@@ -7864,7 +8481,7 @@
             <a:fld id="{7F5CE407-6216-4202-80E4-A30DC2F709B2}" type="slidenum">
               <a:rPr lang="en-US" smtClean="0"/>
               <a:pPr/>
-              <a:t>5</a:t>
+              <a:t>6</a:t>
             </a:fld>
             <a:endParaRPr lang="en-US" dirty="0"/>
           </a:p>
@@ -7879,7 +8496,7 @@
           <p:nvPr>
             <p:extLst>
               <p:ext uri="{D42A27DB-BD31-4B8C-83A1-F6EECF244321}">
-                <p14:modId xmlns:p14="http://schemas.microsoft.com/office/powerpoint/2010/main" val="3351597261"/>
+                <p14:modId xmlns:p14="http://schemas.microsoft.com/office/powerpoint/2010/main" xmlns="" val="3351597261"/>
               </p:ext>
             </p:extLst>
           </p:nvPr>
@@ -8919,7 +9536,7 @@
     </p:spTree>
     <p:extLst>
       <p:ext uri="{BB962C8B-B14F-4D97-AF65-F5344CB8AC3E}">
-        <p14:creationId xmlns:p14="http://schemas.microsoft.com/office/powerpoint/2010/main" val="3622709671"/>
+        <p14:creationId xmlns:p14="http://schemas.microsoft.com/office/powerpoint/2010/main" xmlns="" val="3622709671"/>
       </p:ext>
     </p:extLst>
   </p:cSld>
@@ -8929,14 +9546,14 @@
   <p:timing>
     <p:tnLst>
       <p:par>
-        <p:cTn xmlns:p14="http://schemas.microsoft.com/office/powerpoint/2010/main" id="1" dur="indefinite" restart="never" nodeType="tmRoot"/>
+        <p:cTn id="1" dur="indefinite" restart="never" nodeType="tmRoot"/>
       </p:par>
     </p:tnLst>
   </p:timing>
 </p:sld>
 </file>
 
-<file path=ppt/slides/slide6.xml><?xml version="1.0" encoding="utf-8"?>
+<file path=ppt/slides/slide7.xml><?xml version="1.0" encoding="utf-8"?>
 <p:sld xmlns:a="http://schemas.openxmlformats.org/drawingml/2006/main" xmlns:r="http://schemas.openxmlformats.org/officeDocument/2006/relationships" xmlns:p="http://schemas.openxmlformats.org/presentationml/2006/main">
   <p:cSld>
     <p:spTree>
@@ -9209,14 +9826,14 @@
   <p:timing>
     <p:tnLst>
       <p:par>
-        <p:cTn xmlns:p14="http://schemas.microsoft.com/office/powerpoint/2010/main" id="1" dur="indefinite" restart="never" nodeType="tmRoot"/>
+        <p:cTn id="1" dur="indefinite" restart="never" nodeType="tmRoot"/>
       </p:par>
     </p:tnLst>
   </p:timing>
 </p:sld>
 </file>
 
-<file path=ppt/slides/slide7.xml><?xml version="1.0" encoding="utf-8"?>
+<file path=ppt/slides/slide8.xml><?xml version="1.0" encoding="utf-8"?>
 <p:sld xmlns:a="http://schemas.openxmlformats.org/drawingml/2006/main" xmlns:r="http://schemas.openxmlformats.org/officeDocument/2006/relationships" xmlns:p="http://schemas.openxmlformats.org/presentationml/2006/main">
   <p:cSld>
     <p:spTree>
@@ -9268,7 +9885,7 @@
           <a:blip r:embed="rId2" cstate="print">
             <a:extLst>
               <a:ext uri="{28A0092B-C50C-407E-A947-70E740481C1C}">
-                <a14:useLocalDpi xmlns:a14="http://schemas.microsoft.com/office/drawing/2010/main" val="0"/>
+                <a14:useLocalDpi xmlns:a14="http://schemas.microsoft.com/office/drawing/2010/main" xmlns="" val="0"/>
               </a:ext>
             </a:extLst>
           </a:blip>
@@ -9299,125 +9916,7 @@
   <p:timing>
     <p:tnLst>
       <p:par>
-        <p:cTn xmlns:p14="http://schemas.microsoft.com/office/powerpoint/2010/main" id="1" dur="indefinite" restart="never" nodeType="tmRoot"/>
-      </p:par>
-    </p:tnLst>
-  </p:timing>
-</p:sld>
-</file>
-
-<file path=ppt/slides/slide8.xml><?xml version="1.0" encoding="utf-8"?>
-<p:sld xmlns:a="http://schemas.openxmlformats.org/drawingml/2006/main" xmlns:r="http://schemas.openxmlformats.org/officeDocument/2006/relationships" xmlns:p="http://schemas.openxmlformats.org/presentationml/2006/main">
-  <p:cSld>
-    <p:spTree>
-      <p:nvGrpSpPr>
-        <p:cNvPr id="1" name=""/>
-        <p:cNvGrpSpPr/>
-        <p:nvPr/>
-      </p:nvGrpSpPr>
-      <p:grpSpPr>
-        <a:xfrm>
-          <a:off x="0" y="0"/>
-          <a:ext cx="0" cy="0"/>
-          <a:chOff x="0" y="0"/>
-          <a:chExt cx="0" cy="0"/>
-        </a:xfrm>
-      </p:grpSpPr>
-      <p:sp>
-        <p:nvSpPr>
-          <p:cNvPr id="2" name="Title 1"/>
-          <p:cNvSpPr>
-            <a:spLocks noGrp="1"/>
-          </p:cNvSpPr>
-          <p:nvPr>
-            <p:ph type="title"/>
-          </p:nvPr>
-        </p:nvSpPr>
-        <p:spPr/>
-        <p:txBody>
-          <a:bodyPr/>
-          <a:lstStyle/>
-          <a:p>
-            <a:r>
-              <a:rPr lang="en-US" noProof="0" smtClean="0"/>
-              <a:t>Access Point Authentication</a:t>
-            </a:r>
-            <a:endParaRPr lang="en-US" noProof="0"/>
-          </a:p>
-        </p:txBody>
-      </p:sp>
-      <p:pic>
-        <p:nvPicPr>
-          <p:cNvPr id="5" name="Picture 4" descr="Macintosh HD:Users:canleloglu:Desktop:worddoc:thesisImages:protocolsInDetail:seqDiagram:pdf:accessAuth.pdf"/>
-          <p:cNvPicPr/>
-          <p:nvPr/>
-        </p:nvPicPr>
-        <p:blipFill>
-          <a:blip r:embed="rId2" cstate="print">
-            <a:extLst>
-              <a:ext uri="{28A0092B-C50C-407E-A947-70E740481C1C}">
-                <a14:useLocalDpi xmlns:a14="http://schemas.microsoft.com/office/drawing/2010/main" val="0"/>
-              </a:ext>
-            </a:extLst>
-          </a:blip>
-          <a:srcRect/>
-          <a:stretch>
-            <a:fillRect/>
-          </a:stretch>
-        </p:blipFill>
-        <p:spPr bwMode="auto">
-          <a:xfrm>
-            <a:off x="1857356" y="2571744"/>
-            <a:ext cx="5786478" cy="3786214"/>
-          </a:xfrm>
-          <a:prstGeom prst="rect">
-            <a:avLst/>
-          </a:prstGeom>
-          <a:noFill/>
-          <a:ln>
-            <a:noFill/>
-          </a:ln>
-        </p:spPr>
-      </p:pic>
-      <p:sp>
-        <p:nvSpPr>
-          <p:cNvPr id="4" name="Content Placeholder 2"/>
-          <p:cNvSpPr>
-            <a:spLocks noGrp="1"/>
-          </p:cNvSpPr>
-          <p:nvPr>
-            <p:ph idx="1"/>
-          </p:nvPr>
-        </p:nvSpPr>
-        <p:spPr>
-          <a:xfrm>
-            <a:off x="457200" y="1600201"/>
-            <a:ext cx="8229600" cy="1042981"/>
-          </a:xfrm>
-        </p:spPr>
-        <p:txBody>
-          <a:bodyPr>
-            <a:normAutofit lnSpcReduction="10000"/>
-          </a:bodyPr>
-          <a:lstStyle/>
-          <a:p>
-            <a:r>
-              <a:rPr lang="en-US" noProof="0" smtClean="0"/>
-              <a:t>In order to authenticate the network by the client</a:t>
-            </a:r>
-            <a:endParaRPr lang="en-US" noProof="0"/>
-          </a:p>
-        </p:txBody>
-      </p:sp>
-    </p:spTree>
-  </p:cSld>
-  <p:clrMapOvr>
-    <a:masterClrMapping/>
-  </p:clrMapOvr>
-  <p:timing>
-    <p:tnLst>
-      <p:par>
-        <p:cTn xmlns:p14="http://schemas.microsoft.com/office/powerpoint/2010/main" id="1" dur="indefinite" restart="never" nodeType="tmRoot"/>
+        <p:cTn id="1" dur="indefinite" restart="never" nodeType="tmRoot"/>
       </p:par>
     </p:tnLst>
   </p:timing>
@@ -9451,87 +9950,69 @@
             <p:ph type="title"/>
           </p:nvPr>
         </p:nvSpPr>
+        <p:spPr/>
+        <p:txBody>
+          <a:bodyPr/>
+          <a:lstStyle/>
+          <a:p>
+            <a:r>
+              <a:rPr lang="en-US" noProof="0" smtClean="0"/>
+              <a:t>Access Point Authentication</a:t>
+            </a:r>
+            <a:endParaRPr lang="en-US" noProof="0"/>
+          </a:p>
+        </p:txBody>
+      </p:sp>
+      <p:sp>
+        <p:nvSpPr>
+          <p:cNvPr id="4" name="Content Placeholder 2"/>
+          <p:cNvSpPr>
+            <a:spLocks noGrp="1"/>
+          </p:cNvSpPr>
+          <p:nvPr>
+            <p:ph idx="1"/>
+          </p:nvPr>
+        </p:nvSpPr>
         <p:spPr>
           <a:xfrm>
-            <a:off x="457200" y="274638"/>
-            <a:ext cx="8229600" cy="850106"/>
+            <a:off x="457200" y="1600201"/>
+            <a:ext cx="8229600" cy="1042981"/>
           </a:xfrm>
         </p:spPr>
         <p:txBody>
-          <a:bodyPr/>
+          <a:bodyPr>
+            <a:normAutofit lnSpcReduction="10000"/>
+          </a:bodyPr>
           <a:lstStyle/>
           <a:p>
             <a:r>
               <a:rPr lang="en-US" noProof="0" smtClean="0"/>
-              <a:t>Packet Transfer</a:t>
+              <a:t>In order to authenticate the network by the client</a:t>
             </a:r>
             <a:endParaRPr lang="en-US" noProof="0"/>
           </a:p>
         </p:txBody>
       </p:sp>
-      <p:sp>
-        <p:nvSpPr>
-          <p:cNvPr id="5" name="Content Placeholder 2"/>
-          <p:cNvSpPr>
-            <a:spLocks noGrp="1"/>
-          </p:cNvSpPr>
-          <p:nvPr>
-            <p:ph idx="1"/>
-          </p:nvPr>
-        </p:nvSpPr>
-        <p:spPr>
-          <a:xfrm>
-            <a:off x="467544" y="1124744"/>
-            <a:ext cx="8229600" cy="748680"/>
-          </a:xfrm>
-        </p:spPr>
-        <p:txBody>
-          <a:bodyPr>
-            <a:normAutofit fontScale="77500" lnSpcReduction="20000"/>
-          </a:bodyPr>
-          <a:lstStyle/>
-          <a:p>
-            <a:r>
-              <a:rPr lang="en-US" noProof="0" smtClean="0"/>
-              <a:t>After mutual authentication of client and  access point, client starts to send data packets to access point.</a:t>
-            </a:r>
-            <a:endParaRPr lang="en-US" noProof="0"/>
-          </a:p>
-        </p:txBody>
-      </p:sp>
-      <p:pic>
-        <p:nvPicPr>
-          <p:cNvPr id="6" name="Picture 5" descr="Macintosh HD:Users:canleloglu:Desktop:worddoc:thesisImages:protocolsInDetail:seqDiagram:pdf:packetTransfer.pdf"/>
-          <p:cNvPicPr/>
+      <p:graphicFrame>
+        <p:nvGraphicFramePr>
+          <p:cNvPr id="1026" name="Object 2"/>
+          <p:cNvGraphicFramePr>
+            <a:graphicFrameLocks noChangeAspect="1"/>
+          </p:cNvGraphicFramePr>
           <p:nvPr/>
-        </p:nvPicPr>
-        <p:blipFill>
-          <a:blip r:embed="rId2" cstate="print">
-            <a:extLst>
-              <a:ext uri="{28A0092B-C50C-407E-A947-70E740481C1C}">
-                <a14:useLocalDpi xmlns:a14="http://schemas.microsoft.com/office/drawing/2010/main" val="0"/>
-              </a:ext>
-            </a:extLst>
-          </a:blip>
-          <a:srcRect/>
-          <a:stretch>
-            <a:fillRect/>
-          </a:stretch>
-        </p:blipFill>
-        <p:spPr bwMode="auto">
-          <a:xfrm>
-            <a:off x="2214546" y="1785922"/>
-            <a:ext cx="4481401" cy="5072078"/>
-          </a:xfrm>
-          <a:prstGeom prst="rect">
-            <a:avLst/>
-          </a:prstGeom>
-          <a:noFill/>
-          <a:ln>
-            <a:noFill/>
-          </a:ln>
-        </p:spPr>
-      </p:pic>
+        </p:nvGraphicFramePr>
+        <p:xfrm>
+          <a:off x="1785918" y="2786058"/>
+          <a:ext cx="5289452" cy="3429024"/>
+        </p:xfrm>
+        <a:graphic>
+          <a:graphicData uri="http://schemas.openxmlformats.org/presentationml/2006/ole">
+            <p:oleObj spid="_x0000_s1026" name="Acrobat Document" r:id="rId3" imgW="2762166" imgH="1790494" progId="AcroExch.Document.11">
+              <p:embed/>
+            </p:oleObj>
+          </a:graphicData>
+        </a:graphic>
+      </p:graphicFrame>
     </p:spTree>
   </p:cSld>
   <p:clrMapOvr>
@@ -9540,7 +10021,7 @@
   <p:timing>
     <p:tnLst>
       <p:par>
-        <p:cTn xmlns:p14="http://schemas.microsoft.com/office/powerpoint/2010/main" id="1" dur="indefinite" restart="never" nodeType="tmRoot"/>
+        <p:cTn id="1" dur="indefinite" restart="never" nodeType="tmRoot"/>
       </p:par>
     </p:tnLst>
   </p:timing>

</xml_diff>